<commit_message>
Adicionando páginas do DER, BMPN, Solução Tecnica, Inovação.
</commit_message>
<xml_diff>
--- a/Slides_NetMed_Sprint2.pptx
+++ b/Slides_NetMed_Sprint2.pptx
@@ -7,7 +7,15 @@
   <p:sldIdLst>
     <p:sldId id="256" r:id="rId2"/>
     <p:sldId id="257" r:id="rId3"/>
-    <p:sldId id="258" r:id="rId4"/>
+    <p:sldId id="262" r:id="rId4"/>
+    <p:sldId id="259" r:id="rId5"/>
+    <p:sldId id="263" r:id="rId6"/>
+    <p:sldId id="264" r:id="rId7"/>
+    <p:sldId id="265" r:id="rId8"/>
+    <p:sldId id="266" r:id="rId9"/>
+    <p:sldId id="267" r:id="rId10"/>
+    <p:sldId id="260" r:id="rId11"/>
+    <p:sldId id="261" r:id="rId12"/>
   </p:sldIdLst>
   <p:sldSz cx="12192000" cy="6858000"/>
   <p:notesSz cx="6858000" cy="9144000"/>
@@ -117,13 +125,863 @@
 <file path=ppt/revisionInfo.xml><?xml version="1.0" encoding="utf-8"?>
 <p1510:revInfo xmlns:a="http://schemas.openxmlformats.org/drawingml/2006/main" xmlns:r="http://schemas.openxmlformats.org/officeDocument/2006/relationships" xmlns:p1510="http://schemas.microsoft.com/office/powerpoint/2015/10/main">
   <p1510:revLst>
-    <p1510:client id="{5B440EA2-DE11-412C-A505-B0319508B54D}" v="224" dt="2024-05-04T13:38:02.963"/>
+    <p1510:client id="{8082530A-CFC6-4E58-BB3B-959648091726}" v="382" dt="2024-05-05T18:36:44.339"/>
   </p1510:revLst>
 </p1510:revInfo>
 </file>
 
 <file path=ppt/changesInfos/changesInfo1.xml><?xml version="1.0" encoding="utf-8"?>
 <pc:chgInfo xmlns:a="http://schemas.openxmlformats.org/drawingml/2006/main" xmlns:r="http://schemas.openxmlformats.org/officeDocument/2006/relationships" xmlns:ac="http://schemas.microsoft.com/office/drawing/2013/main/command" xmlns:pc="http://schemas.microsoft.com/office/powerpoint/2013/main/command">
+  <pc:docChgLst>
+    <pc:chgData name="Ketelyn Medina" userId="4342a56e1256850b" providerId="LiveId" clId="{8082530A-CFC6-4E58-BB3B-959648091726}"/>
+    <pc:docChg chg="undo custSel addSld delSld modSld sldOrd">
+      <pc:chgData name="Ketelyn Medina" userId="4342a56e1256850b" providerId="LiveId" clId="{8082530A-CFC6-4E58-BB3B-959648091726}" dt="2024-05-05T18:41:15.111" v="2019" actId="14100"/>
+      <pc:docMkLst>
+        <pc:docMk/>
+      </pc:docMkLst>
+      <pc:sldChg chg="delSp modSp mod modTransition setBg">
+        <pc:chgData name="Ketelyn Medina" userId="4342a56e1256850b" providerId="LiveId" clId="{8082530A-CFC6-4E58-BB3B-959648091726}" dt="2024-05-05T18:18:04.633" v="1045" actId="478"/>
+        <pc:sldMkLst>
+          <pc:docMk/>
+          <pc:sldMk cId="2763673367" sldId="256"/>
+        </pc:sldMkLst>
+        <pc:spChg chg="mod">
+          <ac:chgData name="Ketelyn Medina" userId="4342a56e1256850b" providerId="LiveId" clId="{8082530A-CFC6-4E58-BB3B-959648091726}" dt="2024-05-05T18:16:20.234" v="773" actId="20577"/>
+          <ac:spMkLst>
+            <pc:docMk/>
+            <pc:sldMk cId="2763673367" sldId="256"/>
+            <ac:spMk id="3" creationId="{4DDA0383-46E0-281C-8AE9-B92E84EF859C}"/>
+          </ac:spMkLst>
+        </pc:spChg>
+        <pc:spChg chg="del mod">
+          <ac:chgData name="Ketelyn Medina" userId="4342a56e1256850b" providerId="LiveId" clId="{8082530A-CFC6-4E58-BB3B-959648091726}" dt="2024-05-05T18:18:04.633" v="1045" actId="478"/>
+          <ac:spMkLst>
+            <pc:docMk/>
+            <pc:sldMk cId="2763673367" sldId="256"/>
+            <ac:spMk id="5" creationId="{F9E05431-9436-DE25-E0FC-AA20248FE1F2}"/>
+          </ac:spMkLst>
+        </pc:spChg>
+        <pc:picChg chg="mod">
+          <ac:chgData name="Ketelyn Medina" userId="4342a56e1256850b" providerId="LiveId" clId="{8082530A-CFC6-4E58-BB3B-959648091726}" dt="2024-05-05T18:17:57.352" v="1042" actId="29295"/>
+          <ac:picMkLst>
+            <pc:docMk/>
+            <pc:sldMk cId="2763673367" sldId="256"/>
+            <ac:picMk id="9" creationId="{D95693EB-31CE-4CCC-6D95-0ADBD48BD569}"/>
+          </ac:picMkLst>
+        </pc:picChg>
+      </pc:sldChg>
+      <pc:sldChg chg="modSp mod modTransition">
+        <pc:chgData name="Ketelyn Medina" userId="4342a56e1256850b" providerId="LiveId" clId="{8082530A-CFC6-4E58-BB3B-959648091726}" dt="2024-05-04T14:19:13.339" v="556"/>
+        <pc:sldMkLst>
+          <pc:docMk/>
+          <pc:sldMk cId="1293696960" sldId="257"/>
+        </pc:sldMkLst>
+        <pc:spChg chg="mod">
+          <ac:chgData name="Ketelyn Medina" userId="4342a56e1256850b" providerId="LiveId" clId="{8082530A-CFC6-4E58-BB3B-959648091726}" dt="2024-05-04T14:17:03.552" v="544" actId="27636"/>
+          <ac:spMkLst>
+            <pc:docMk/>
+            <pc:sldMk cId="1293696960" sldId="257"/>
+            <ac:spMk id="2" creationId="{20C3634F-5961-75A1-7A12-38E0737A4070}"/>
+          </ac:spMkLst>
+        </pc:spChg>
+      </pc:sldChg>
+      <pc:sldChg chg="addSp delSp modSp del mod ord">
+        <pc:chgData name="Ketelyn Medina" userId="4342a56e1256850b" providerId="LiveId" clId="{8082530A-CFC6-4E58-BB3B-959648091726}" dt="2024-05-05T18:22:54.507" v="1118" actId="47"/>
+        <pc:sldMkLst>
+          <pc:docMk/>
+          <pc:sldMk cId="53127966" sldId="258"/>
+        </pc:sldMkLst>
+        <pc:spChg chg="mod">
+          <ac:chgData name="Ketelyn Medina" userId="4342a56e1256850b" providerId="LiveId" clId="{8082530A-CFC6-4E58-BB3B-959648091726}" dt="2024-05-04T13:45:11.865" v="2" actId="14100"/>
+          <ac:spMkLst>
+            <pc:docMk/>
+            <pc:sldMk cId="53127966" sldId="258"/>
+            <ac:spMk id="2" creationId="{4513B46C-8276-1518-93A5-526E041946FC}"/>
+          </ac:spMkLst>
+        </pc:spChg>
+        <pc:spChg chg="mod">
+          <ac:chgData name="Ketelyn Medina" userId="4342a56e1256850b" providerId="LiveId" clId="{8082530A-CFC6-4E58-BB3B-959648091726}" dt="2024-05-04T13:45:35.827" v="3" actId="2711"/>
+          <ac:spMkLst>
+            <pc:docMk/>
+            <pc:sldMk cId="53127966" sldId="258"/>
+            <ac:spMk id="3" creationId="{5161CDC8-FF07-0AD5-6381-DD5D23BA23D4}"/>
+          </ac:spMkLst>
+        </pc:spChg>
+        <pc:spChg chg="mod">
+          <ac:chgData name="Ketelyn Medina" userId="4342a56e1256850b" providerId="LiveId" clId="{8082530A-CFC6-4E58-BB3B-959648091726}" dt="2024-05-04T13:45:58.556" v="6" actId="2711"/>
+          <ac:spMkLst>
+            <pc:docMk/>
+            <pc:sldMk cId="53127966" sldId="258"/>
+            <ac:spMk id="4" creationId="{69653506-C7EF-3417-0623-767B75632118}"/>
+          </ac:spMkLst>
+        </pc:spChg>
+        <pc:spChg chg="add del">
+          <ac:chgData name="Ketelyn Medina" userId="4342a56e1256850b" providerId="LiveId" clId="{8082530A-CFC6-4E58-BB3B-959648091726}" dt="2024-05-04T13:46:48.953" v="12" actId="22"/>
+          <ac:spMkLst>
+            <pc:docMk/>
+            <pc:sldMk cId="53127966" sldId="258"/>
+            <ac:spMk id="6" creationId="{6F42A4BD-0916-3E5A-6FF4-59183A5BD582}"/>
+          </ac:spMkLst>
+        </pc:spChg>
+        <pc:spChg chg="mod">
+          <ac:chgData name="Ketelyn Medina" userId="4342a56e1256850b" providerId="LiveId" clId="{8082530A-CFC6-4E58-BB3B-959648091726}" dt="2024-05-04T13:46:15.369" v="7" actId="2711"/>
+          <ac:spMkLst>
+            <pc:docMk/>
+            <pc:sldMk cId="53127966" sldId="258"/>
+            <ac:spMk id="8" creationId="{C3369C1D-136B-54E8-3981-7C2EDC2AFA7F}"/>
+          </ac:spMkLst>
+        </pc:spChg>
+        <pc:spChg chg="mod">
+          <ac:chgData name="Ketelyn Medina" userId="4342a56e1256850b" providerId="LiveId" clId="{8082530A-CFC6-4E58-BB3B-959648091726}" dt="2024-05-04T13:46:20.335" v="8" actId="2711"/>
+          <ac:spMkLst>
+            <pc:docMk/>
+            <pc:sldMk cId="53127966" sldId="258"/>
+            <ac:spMk id="11" creationId="{F1FD733B-1603-551D-9FC5-27D724BC858D}"/>
+          </ac:spMkLst>
+        </pc:spChg>
+        <pc:spChg chg="mod">
+          <ac:chgData name="Ketelyn Medina" userId="4342a56e1256850b" providerId="LiveId" clId="{8082530A-CFC6-4E58-BB3B-959648091726}" dt="2024-05-04T13:46:31.811" v="9" actId="2711"/>
+          <ac:spMkLst>
+            <pc:docMk/>
+            <pc:sldMk cId="53127966" sldId="258"/>
+            <ac:spMk id="13" creationId="{167A2AA1-3F45-D352-67E0-D09C55F5E60F}"/>
+          </ac:spMkLst>
+        </pc:spChg>
+        <pc:spChg chg="mod">
+          <ac:chgData name="Ketelyn Medina" userId="4342a56e1256850b" providerId="LiveId" clId="{8082530A-CFC6-4E58-BB3B-959648091726}" dt="2024-05-04T13:46:39.699" v="10" actId="2711"/>
+          <ac:spMkLst>
+            <pc:docMk/>
+            <pc:sldMk cId="53127966" sldId="258"/>
+            <ac:spMk id="15" creationId="{7AE60127-37B0-DBA1-1337-4D79A0CD6557}"/>
+          </ac:spMkLst>
+        </pc:spChg>
+        <pc:spChg chg="mod">
+          <ac:chgData name="Ketelyn Medina" userId="4342a56e1256850b" providerId="LiveId" clId="{8082530A-CFC6-4E58-BB3B-959648091726}" dt="2024-05-04T13:45:49.525" v="5" actId="14100"/>
+          <ac:spMkLst>
+            <pc:docMk/>
+            <pc:sldMk cId="53127966" sldId="258"/>
+            <ac:spMk id="16" creationId="{6ACF3904-1EFF-12EA-8577-2DA04B669099}"/>
+          </ac:spMkLst>
+        </pc:spChg>
+      </pc:sldChg>
+      <pc:sldChg chg="addSp modSp add mod ord">
+        <pc:chgData name="Ketelyn Medina" userId="4342a56e1256850b" providerId="LiveId" clId="{8082530A-CFC6-4E58-BB3B-959648091726}" dt="2024-05-05T18:22:41.119" v="1117" actId="404"/>
+        <pc:sldMkLst>
+          <pc:docMk/>
+          <pc:sldMk cId="3053839141" sldId="259"/>
+        </pc:sldMkLst>
+        <pc:spChg chg="mod">
+          <ac:chgData name="Ketelyn Medina" userId="4342a56e1256850b" providerId="LiveId" clId="{8082530A-CFC6-4E58-BB3B-959648091726}" dt="2024-05-05T18:22:41.119" v="1117" actId="404"/>
+          <ac:spMkLst>
+            <pc:docMk/>
+            <pc:sldMk cId="3053839141" sldId="259"/>
+            <ac:spMk id="2" creationId="{4513B46C-8276-1518-93A5-526E041946FC}"/>
+          </ac:spMkLst>
+        </pc:spChg>
+        <pc:spChg chg="mod">
+          <ac:chgData name="Ketelyn Medina" userId="4342a56e1256850b" providerId="LiveId" clId="{8082530A-CFC6-4E58-BB3B-959648091726}" dt="2024-05-05T18:22:20.054" v="1112" actId="1076"/>
+          <ac:spMkLst>
+            <pc:docMk/>
+            <pc:sldMk cId="3053839141" sldId="259"/>
+            <ac:spMk id="3" creationId="{5161CDC8-FF07-0AD5-6381-DD5D23BA23D4}"/>
+          </ac:spMkLst>
+        </pc:spChg>
+        <pc:spChg chg="mod">
+          <ac:chgData name="Ketelyn Medina" userId="4342a56e1256850b" providerId="LiveId" clId="{8082530A-CFC6-4E58-BB3B-959648091726}" dt="2024-05-05T18:22:05.342" v="1110" actId="1076"/>
+          <ac:spMkLst>
+            <pc:docMk/>
+            <pc:sldMk cId="3053839141" sldId="259"/>
+            <ac:spMk id="4" creationId="{69653506-C7EF-3417-0623-767B75632118}"/>
+          </ac:spMkLst>
+        </pc:spChg>
+        <pc:spChg chg="mod">
+          <ac:chgData name="Ketelyn Medina" userId="4342a56e1256850b" providerId="LiveId" clId="{8082530A-CFC6-4E58-BB3B-959648091726}" dt="2024-05-05T18:22:05.342" v="1110" actId="1076"/>
+          <ac:spMkLst>
+            <pc:docMk/>
+            <pc:sldMk cId="3053839141" sldId="259"/>
+            <ac:spMk id="8" creationId="{C3369C1D-136B-54E8-3981-7C2EDC2AFA7F}"/>
+          </ac:spMkLst>
+        </pc:spChg>
+        <pc:spChg chg="mod">
+          <ac:chgData name="Ketelyn Medina" userId="4342a56e1256850b" providerId="LiveId" clId="{8082530A-CFC6-4E58-BB3B-959648091726}" dt="2024-05-05T18:22:05.342" v="1110" actId="1076"/>
+          <ac:spMkLst>
+            <pc:docMk/>
+            <pc:sldMk cId="3053839141" sldId="259"/>
+            <ac:spMk id="11" creationId="{F1FD733B-1603-551D-9FC5-27D724BC858D}"/>
+          </ac:spMkLst>
+        </pc:spChg>
+        <pc:spChg chg="mod">
+          <ac:chgData name="Ketelyn Medina" userId="4342a56e1256850b" providerId="LiveId" clId="{8082530A-CFC6-4E58-BB3B-959648091726}" dt="2024-05-05T18:22:05.342" v="1110" actId="1076"/>
+          <ac:spMkLst>
+            <pc:docMk/>
+            <pc:sldMk cId="3053839141" sldId="259"/>
+            <ac:spMk id="13" creationId="{167A2AA1-3F45-D352-67E0-D09C55F5E60F}"/>
+          </ac:spMkLst>
+        </pc:spChg>
+        <pc:spChg chg="mod">
+          <ac:chgData name="Ketelyn Medina" userId="4342a56e1256850b" providerId="LiveId" clId="{8082530A-CFC6-4E58-BB3B-959648091726}" dt="2024-05-05T18:22:05.342" v="1110" actId="1076"/>
+          <ac:spMkLst>
+            <pc:docMk/>
+            <pc:sldMk cId="3053839141" sldId="259"/>
+            <ac:spMk id="15" creationId="{7AE60127-37B0-DBA1-1337-4D79A0CD6557}"/>
+          </ac:spMkLst>
+        </pc:spChg>
+        <pc:spChg chg="mod">
+          <ac:chgData name="Ketelyn Medina" userId="4342a56e1256850b" providerId="LiveId" clId="{8082530A-CFC6-4E58-BB3B-959648091726}" dt="2024-05-05T18:22:11.280" v="1111" actId="1076"/>
+          <ac:spMkLst>
+            <pc:docMk/>
+            <pc:sldMk cId="3053839141" sldId="259"/>
+            <ac:spMk id="16" creationId="{6ACF3904-1EFF-12EA-8577-2DA04B669099}"/>
+          </ac:spMkLst>
+        </pc:spChg>
+        <pc:grpChg chg="add mod">
+          <ac:chgData name="Ketelyn Medina" userId="4342a56e1256850b" providerId="LiveId" clId="{8082530A-CFC6-4E58-BB3B-959648091726}" dt="2024-05-05T18:22:05.342" v="1110" actId="1076"/>
+          <ac:grpSpMkLst>
+            <pc:docMk/>
+            <pc:sldMk cId="3053839141" sldId="259"/>
+            <ac:grpSpMk id="5" creationId="{E5B1075F-FBE6-707B-4B87-408F2FC21B93}"/>
+          </ac:grpSpMkLst>
+        </pc:grpChg>
+        <pc:picChg chg="mod">
+          <ac:chgData name="Ketelyn Medina" userId="4342a56e1256850b" providerId="LiveId" clId="{8082530A-CFC6-4E58-BB3B-959648091726}" dt="2024-05-05T18:22:05.342" v="1110" actId="1076"/>
+          <ac:picMkLst>
+            <pc:docMk/>
+            <pc:sldMk cId="3053839141" sldId="259"/>
+            <ac:picMk id="10" creationId="{38166DD5-B561-E941-B9DF-B7A5CFF0422C}"/>
+          </ac:picMkLst>
+        </pc:picChg>
+        <pc:picChg chg="mod">
+          <ac:chgData name="Ketelyn Medina" userId="4342a56e1256850b" providerId="LiveId" clId="{8082530A-CFC6-4E58-BB3B-959648091726}" dt="2024-05-05T18:22:05.342" v="1110" actId="1076"/>
+          <ac:picMkLst>
+            <pc:docMk/>
+            <pc:sldMk cId="3053839141" sldId="259"/>
+            <ac:picMk id="12" creationId="{7923D9CC-8864-F46E-68B5-1C96138C1508}"/>
+          </ac:picMkLst>
+        </pc:picChg>
+        <pc:picChg chg="mod">
+          <ac:chgData name="Ketelyn Medina" userId="4342a56e1256850b" providerId="LiveId" clId="{8082530A-CFC6-4E58-BB3B-959648091726}" dt="2024-05-05T18:22:05.342" v="1110" actId="1076"/>
+          <ac:picMkLst>
+            <pc:docMk/>
+            <pc:sldMk cId="3053839141" sldId="259"/>
+            <ac:picMk id="14" creationId="{E9F3F5D2-3972-8075-51D6-085620EFBB7D}"/>
+          </ac:picMkLst>
+        </pc:picChg>
+        <pc:picChg chg="mod">
+          <ac:chgData name="Ketelyn Medina" userId="4342a56e1256850b" providerId="LiveId" clId="{8082530A-CFC6-4E58-BB3B-959648091726}" dt="2024-05-05T18:22:05.342" v="1110" actId="1076"/>
+          <ac:picMkLst>
+            <pc:docMk/>
+            <pc:sldMk cId="3053839141" sldId="259"/>
+            <ac:picMk id="1026" creationId="{A4B7FC50-3CF9-2392-5CED-4A22B3985719}"/>
+          </ac:picMkLst>
+        </pc:picChg>
+        <pc:picChg chg="mod">
+          <ac:chgData name="Ketelyn Medina" userId="4342a56e1256850b" providerId="LiveId" clId="{8082530A-CFC6-4E58-BB3B-959648091726}" dt="2024-05-05T18:22:05.342" v="1110" actId="1076"/>
+          <ac:picMkLst>
+            <pc:docMk/>
+            <pc:sldMk cId="3053839141" sldId="259"/>
+            <ac:picMk id="1028" creationId="{B01FDC99-A2BA-A7F5-027F-D811DE509FC7}"/>
+          </ac:picMkLst>
+        </pc:picChg>
+      </pc:sldChg>
+      <pc:sldChg chg="addSp delSp modSp add mod ord setBg">
+        <pc:chgData name="Ketelyn Medina" userId="4342a56e1256850b" providerId="LiveId" clId="{8082530A-CFC6-4E58-BB3B-959648091726}" dt="2024-05-05T18:14:03.414" v="562"/>
+        <pc:sldMkLst>
+          <pc:docMk/>
+          <pc:sldMk cId="3985326264" sldId="260"/>
+        </pc:sldMkLst>
+        <pc:spChg chg="del">
+          <ac:chgData name="Ketelyn Medina" userId="4342a56e1256850b" providerId="LiveId" clId="{8082530A-CFC6-4E58-BB3B-959648091726}" dt="2024-05-04T13:55:38.568" v="72" actId="478"/>
+          <ac:spMkLst>
+            <pc:docMk/>
+            <pc:sldMk cId="3985326264" sldId="260"/>
+            <ac:spMk id="2" creationId="{4513B46C-8276-1518-93A5-526E041946FC}"/>
+          </ac:spMkLst>
+        </pc:spChg>
+        <pc:spChg chg="del">
+          <ac:chgData name="Ketelyn Medina" userId="4342a56e1256850b" providerId="LiveId" clId="{8082530A-CFC6-4E58-BB3B-959648091726}" dt="2024-05-04T13:55:42.398" v="74" actId="478"/>
+          <ac:spMkLst>
+            <pc:docMk/>
+            <pc:sldMk cId="3985326264" sldId="260"/>
+            <ac:spMk id="3" creationId="{5161CDC8-FF07-0AD5-6381-DD5D23BA23D4}"/>
+          </ac:spMkLst>
+        </pc:spChg>
+        <pc:spChg chg="add del mod">
+          <ac:chgData name="Ketelyn Medina" userId="4342a56e1256850b" providerId="LiveId" clId="{8082530A-CFC6-4E58-BB3B-959648091726}" dt="2024-05-04T13:55:40.635" v="73" actId="478"/>
+          <ac:spMkLst>
+            <pc:docMk/>
+            <pc:sldMk cId="3985326264" sldId="260"/>
+            <ac:spMk id="7" creationId="{C561222E-7E4A-FE18-D849-F1D2643F6999}"/>
+          </ac:spMkLst>
+        </pc:spChg>
+        <pc:spChg chg="del mod">
+          <ac:chgData name="Ketelyn Medina" userId="4342a56e1256850b" providerId="LiveId" clId="{8082530A-CFC6-4E58-BB3B-959648091726}" dt="2024-05-04T13:55:53.682" v="80" actId="478"/>
+          <ac:spMkLst>
+            <pc:docMk/>
+            <pc:sldMk cId="3985326264" sldId="260"/>
+            <ac:spMk id="8" creationId="{C3369C1D-136B-54E8-3981-7C2EDC2AFA7F}"/>
+          </ac:spMkLst>
+        </pc:spChg>
+        <pc:spChg chg="del">
+          <ac:chgData name="Ketelyn Medina" userId="4342a56e1256850b" providerId="LiveId" clId="{8082530A-CFC6-4E58-BB3B-959648091726}" dt="2024-05-04T13:55:55.224" v="81" actId="478"/>
+          <ac:spMkLst>
+            <pc:docMk/>
+            <pc:sldMk cId="3985326264" sldId="260"/>
+            <ac:spMk id="11" creationId="{F1FD733B-1603-551D-9FC5-27D724BC858D}"/>
+          </ac:spMkLst>
+        </pc:spChg>
+        <pc:spChg chg="del mod">
+          <ac:chgData name="Ketelyn Medina" userId="4342a56e1256850b" providerId="LiveId" clId="{8082530A-CFC6-4E58-BB3B-959648091726}" dt="2024-05-04T13:56:00.022" v="86" actId="478"/>
+          <ac:spMkLst>
+            <pc:docMk/>
+            <pc:sldMk cId="3985326264" sldId="260"/>
+            <ac:spMk id="13" creationId="{167A2AA1-3F45-D352-67E0-D09C55F5E60F}"/>
+          </ac:spMkLst>
+        </pc:spChg>
+        <pc:spChg chg="del">
+          <ac:chgData name="Ketelyn Medina" userId="4342a56e1256850b" providerId="LiveId" clId="{8082530A-CFC6-4E58-BB3B-959648091726}" dt="2024-05-04T13:56:01.822" v="87" actId="478"/>
+          <ac:spMkLst>
+            <pc:docMk/>
+            <pc:sldMk cId="3985326264" sldId="260"/>
+            <ac:spMk id="15" creationId="{7AE60127-37B0-DBA1-1337-4D79A0CD6557}"/>
+          </ac:spMkLst>
+        </pc:spChg>
+        <pc:spChg chg="del">
+          <ac:chgData name="Ketelyn Medina" userId="4342a56e1256850b" providerId="LiveId" clId="{8082530A-CFC6-4E58-BB3B-959648091726}" dt="2024-05-04T13:55:46.714" v="76" actId="478"/>
+          <ac:spMkLst>
+            <pc:docMk/>
+            <pc:sldMk cId="3985326264" sldId="260"/>
+            <ac:spMk id="16" creationId="{6ACF3904-1EFF-12EA-8577-2DA04B669099}"/>
+          </ac:spMkLst>
+        </pc:spChg>
+        <pc:spChg chg="add del mod">
+          <ac:chgData name="Ketelyn Medina" userId="4342a56e1256850b" providerId="LiveId" clId="{8082530A-CFC6-4E58-BB3B-959648091726}" dt="2024-05-04T13:55:44.682" v="75" actId="478"/>
+          <ac:spMkLst>
+            <pc:docMk/>
+            <pc:sldMk cId="3985326264" sldId="260"/>
+            <ac:spMk id="17" creationId="{C875E4D0-7992-CE0D-4803-37BCCA38A72C}"/>
+          </ac:spMkLst>
+        </pc:spChg>
+        <pc:spChg chg="add del mod">
+          <ac:chgData name="Ketelyn Medina" userId="4342a56e1256850b" providerId="LiveId" clId="{8082530A-CFC6-4E58-BB3B-959648091726}" dt="2024-05-04T14:01:29.923" v="203" actId="478"/>
+          <ac:spMkLst>
+            <pc:docMk/>
+            <pc:sldMk cId="3985326264" sldId="260"/>
+            <ac:spMk id="18" creationId="{49C34B81-B234-728C-05CD-ABBE7E1BC47F}"/>
+          </ac:spMkLst>
+        </pc:spChg>
+        <pc:spChg chg="add del mod">
+          <ac:chgData name="Ketelyn Medina" userId="4342a56e1256850b" providerId="LiveId" clId="{8082530A-CFC6-4E58-BB3B-959648091726}" dt="2024-05-04T14:09:13.589" v="355" actId="478"/>
+          <ac:spMkLst>
+            <pc:docMk/>
+            <pc:sldMk cId="3985326264" sldId="260"/>
+            <ac:spMk id="19" creationId="{F0F86861-B139-492B-B666-D3A101024DD9}"/>
+          </ac:spMkLst>
+        </pc:spChg>
+        <pc:grpChg chg="del">
+          <ac:chgData name="Ketelyn Medina" userId="4342a56e1256850b" providerId="LiveId" clId="{8082530A-CFC6-4E58-BB3B-959648091726}" dt="2024-05-04T13:55:49.109" v="77" actId="478"/>
+          <ac:grpSpMkLst>
+            <pc:docMk/>
+            <pc:sldMk cId="3985326264" sldId="260"/>
+            <ac:grpSpMk id="5" creationId="{E5B1075F-FBE6-707B-4B87-408F2FC21B93}"/>
+          </ac:grpSpMkLst>
+        </pc:grpChg>
+        <pc:picChg chg="del">
+          <ac:chgData name="Ketelyn Medina" userId="4342a56e1256850b" providerId="LiveId" clId="{8082530A-CFC6-4E58-BB3B-959648091726}" dt="2024-05-04T13:55:56.246" v="82" actId="478"/>
+          <ac:picMkLst>
+            <pc:docMk/>
+            <pc:sldMk cId="3985326264" sldId="260"/>
+            <ac:picMk id="10" creationId="{38166DD5-B561-E941-B9DF-B7A5CFF0422C}"/>
+          </ac:picMkLst>
+        </pc:picChg>
+        <pc:picChg chg="del">
+          <ac:chgData name="Ketelyn Medina" userId="4342a56e1256850b" providerId="LiveId" clId="{8082530A-CFC6-4E58-BB3B-959648091726}" dt="2024-05-04T13:55:57.447" v="83" actId="478"/>
+          <ac:picMkLst>
+            <pc:docMk/>
+            <pc:sldMk cId="3985326264" sldId="260"/>
+            <ac:picMk id="12" creationId="{7923D9CC-8864-F46E-68B5-1C96138C1508}"/>
+          </ac:picMkLst>
+        </pc:picChg>
+        <pc:picChg chg="del">
+          <ac:chgData name="Ketelyn Medina" userId="4342a56e1256850b" providerId="LiveId" clId="{8082530A-CFC6-4E58-BB3B-959648091726}" dt="2024-05-04T13:55:57.704" v="84" actId="478"/>
+          <ac:picMkLst>
+            <pc:docMk/>
+            <pc:sldMk cId="3985326264" sldId="260"/>
+            <ac:picMk id="14" creationId="{E9F3F5D2-3972-8075-51D6-085620EFBB7D}"/>
+          </ac:picMkLst>
+        </pc:picChg>
+        <pc:picChg chg="del">
+          <ac:chgData name="Ketelyn Medina" userId="4342a56e1256850b" providerId="LiveId" clId="{8082530A-CFC6-4E58-BB3B-959648091726}" dt="2024-05-04T13:55:50.574" v="78" actId="478"/>
+          <ac:picMkLst>
+            <pc:docMk/>
+            <pc:sldMk cId="3985326264" sldId="260"/>
+            <ac:picMk id="1028" creationId="{B01FDC99-A2BA-A7F5-027F-D811DE509FC7}"/>
+          </ac:picMkLst>
+        </pc:picChg>
+      </pc:sldChg>
+      <pc:sldChg chg="addSp modSp add mod ord modTransition">
+        <pc:chgData name="Ketelyn Medina" userId="4342a56e1256850b" providerId="LiveId" clId="{8082530A-CFC6-4E58-BB3B-959648091726}" dt="2024-05-05T18:16:24.073" v="776"/>
+        <pc:sldMkLst>
+          <pc:docMk/>
+          <pc:sldMk cId="936976568" sldId="261"/>
+        </pc:sldMkLst>
+        <pc:spChg chg="mod ord">
+          <ac:chgData name="Ketelyn Medina" userId="4342a56e1256850b" providerId="LiveId" clId="{8082530A-CFC6-4E58-BB3B-959648091726}" dt="2024-05-04T14:10:26.927" v="418" actId="166"/>
+          <ac:spMkLst>
+            <pc:docMk/>
+            <pc:sldMk cId="936976568" sldId="261"/>
+            <ac:spMk id="18" creationId="{49C34B81-B234-728C-05CD-ABBE7E1BC47F}"/>
+          </ac:spMkLst>
+        </pc:spChg>
+        <pc:picChg chg="add mod">
+          <ac:chgData name="Ketelyn Medina" userId="4342a56e1256850b" providerId="LiveId" clId="{8082530A-CFC6-4E58-BB3B-959648091726}" dt="2024-05-04T14:11:41.145" v="510" actId="29295"/>
+          <ac:picMkLst>
+            <pc:docMk/>
+            <pc:sldMk cId="936976568" sldId="261"/>
+            <ac:picMk id="2" creationId="{A0F43605-50CF-2F52-901C-5567AD23653B}"/>
+          </ac:picMkLst>
+        </pc:picChg>
+      </pc:sldChg>
+      <pc:sldChg chg="addSp delSp modSp add del mod ord modTransition setBg delDesignElem chgLayout">
+        <pc:chgData name="Ketelyn Medina" userId="4342a56e1256850b" providerId="LiveId" clId="{8082530A-CFC6-4E58-BB3B-959648091726}" dt="2024-05-05T18:20:24.578" v="1108"/>
+        <pc:sldMkLst>
+          <pc:docMk/>
+          <pc:sldMk cId="230846951" sldId="262"/>
+        </pc:sldMkLst>
+        <pc:spChg chg="del">
+          <ac:chgData name="Ketelyn Medina" userId="4342a56e1256850b" providerId="LiveId" clId="{8082530A-CFC6-4E58-BB3B-959648091726}" dt="2024-05-04T14:13:03.479" v="519" actId="478"/>
+          <ac:spMkLst>
+            <pc:docMk/>
+            <pc:sldMk cId="230846951" sldId="262"/>
+            <ac:spMk id="2" creationId="{5B851898-EE7A-A075-139C-7EC351221405}"/>
+          </ac:spMkLst>
+        </pc:spChg>
+        <pc:spChg chg="add mod">
+          <ac:chgData name="Ketelyn Medina" userId="4342a56e1256850b" providerId="LiveId" clId="{8082530A-CFC6-4E58-BB3B-959648091726}" dt="2024-05-05T18:20:09.046" v="1106" actId="1076"/>
+          <ac:spMkLst>
+            <pc:docMk/>
+            <pc:sldMk cId="230846951" sldId="262"/>
+            <ac:spMk id="2" creationId="{BF51CFD8-D552-A71D-BE12-450E14F80B68}"/>
+          </ac:spMkLst>
+        </pc:spChg>
+        <pc:spChg chg="del">
+          <ac:chgData name="Ketelyn Medina" userId="4342a56e1256850b" providerId="LiveId" clId="{8082530A-CFC6-4E58-BB3B-959648091726}" dt="2024-05-04T14:12:58.969" v="517" actId="478"/>
+          <ac:spMkLst>
+            <pc:docMk/>
+            <pc:sldMk cId="230846951" sldId="262"/>
+            <ac:spMk id="3" creationId="{4DDA0383-46E0-281C-8AE9-B92E84EF859C}"/>
+          </ac:spMkLst>
+        </pc:spChg>
+        <pc:spChg chg="del">
+          <ac:chgData name="Ketelyn Medina" userId="4342a56e1256850b" providerId="LiveId" clId="{8082530A-CFC6-4E58-BB3B-959648091726}" dt="2024-05-04T14:12:50.074" v="516" actId="478"/>
+          <ac:spMkLst>
+            <pc:docMk/>
+            <pc:sldMk cId="230846951" sldId="262"/>
+            <ac:spMk id="5" creationId="{F9E05431-9436-DE25-E0FC-AA20248FE1F2}"/>
+          </ac:spMkLst>
+        </pc:spChg>
+        <pc:spChg chg="add del mod">
+          <ac:chgData name="Ketelyn Medina" userId="4342a56e1256850b" providerId="LiveId" clId="{8082530A-CFC6-4E58-BB3B-959648091726}" dt="2024-05-04T14:13:01.084" v="518" actId="478"/>
+          <ac:spMkLst>
+            <pc:docMk/>
+            <pc:sldMk cId="230846951" sldId="262"/>
+            <ac:spMk id="7" creationId="{7419DB2E-36B8-0FB0-CC2E-44BB49FF72EF}"/>
+          </ac:spMkLst>
+        </pc:spChg>
+        <pc:spChg chg="add del mod">
+          <ac:chgData name="Ketelyn Medina" userId="4342a56e1256850b" providerId="LiveId" clId="{8082530A-CFC6-4E58-BB3B-959648091726}" dt="2024-05-04T14:13:05.162" v="520" actId="478"/>
+          <ac:spMkLst>
+            <pc:docMk/>
+            <pc:sldMk cId="230846951" sldId="262"/>
+            <ac:spMk id="10" creationId="{E58CED1D-84F9-236F-F887-47476B3F5781}"/>
+          </ac:spMkLst>
+        </pc:spChg>
+        <pc:spChg chg="add del mod ord">
+          <ac:chgData name="Ketelyn Medina" userId="4342a56e1256850b" providerId="LiveId" clId="{8082530A-CFC6-4E58-BB3B-959648091726}" dt="2024-05-04T14:13:12.886" v="522" actId="6264"/>
+          <ac:spMkLst>
+            <pc:docMk/>
+            <pc:sldMk cId="230846951" sldId="262"/>
+            <ac:spMk id="11" creationId="{1C876A39-7070-BAD4-D371-A2A9D519DE15}"/>
+          </ac:spMkLst>
+        </pc:spChg>
+        <pc:spChg chg="add del mod ord">
+          <ac:chgData name="Ketelyn Medina" userId="4342a56e1256850b" providerId="LiveId" clId="{8082530A-CFC6-4E58-BB3B-959648091726}" dt="2024-05-04T14:13:12.886" v="522" actId="6264"/>
+          <ac:spMkLst>
+            <pc:docMk/>
+            <pc:sldMk cId="230846951" sldId="262"/>
+            <ac:spMk id="12" creationId="{6292D44A-B562-FA91-7075-99502687CCE2}"/>
+          </ac:spMkLst>
+        </pc:spChg>
+        <pc:spChg chg="add del">
+          <ac:chgData name="Ketelyn Medina" userId="4342a56e1256850b" providerId="LiveId" clId="{8082530A-CFC6-4E58-BB3B-959648091726}" dt="2024-05-04T14:13:12.886" v="522" actId="6264"/>
+          <ac:spMkLst>
+            <pc:docMk/>
+            <pc:sldMk cId="230846951" sldId="262"/>
+            <ac:spMk id="14" creationId="{0671A8AE-40A1-4631-A6B8-581AFF065482}"/>
+          </ac:spMkLst>
+        </pc:spChg>
+        <pc:spChg chg="add del">
+          <ac:chgData name="Ketelyn Medina" userId="4342a56e1256850b" providerId="LiveId" clId="{8082530A-CFC6-4E58-BB3B-959648091726}" dt="2024-05-04T14:13:12.886" v="522" actId="6264"/>
+          <ac:spMkLst>
+            <pc:docMk/>
+            <pc:sldMk cId="230846951" sldId="262"/>
+            <ac:spMk id="16" creationId="{AB58EF07-17C2-48CF-ABB0-EEF1F17CB8F0}"/>
+          </ac:spMkLst>
+        </pc:spChg>
+        <pc:spChg chg="add del">
+          <ac:chgData name="Ketelyn Medina" userId="4342a56e1256850b" providerId="LiveId" clId="{8082530A-CFC6-4E58-BB3B-959648091726}" dt="2024-05-04T14:13:12.886" v="522" actId="6264"/>
+          <ac:spMkLst>
+            <pc:docMk/>
+            <pc:sldMk cId="230846951" sldId="262"/>
+            <ac:spMk id="18" creationId="{AF2F604E-43BE-4DC3-B983-E071523364F8}"/>
+          </ac:spMkLst>
+        </pc:spChg>
+        <pc:spChg chg="add del">
+          <ac:chgData name="Ketelyn Medina" userId="4342a56e1256850b" providerId="LiveId" clId="{8082530A-CFC6-4E58-BB3B-959648091726}" dt="2024-05-04T14:13:12.886" v="522" actId="6264"/>
+          <ac:spMkLst>
+            <pc:docMk/>
+            <pc:sldMk cId="230846951" sldId="262"/>
+            <ac:spMk id="20" creationId="{08C9B587-E65E-4B52-B37C-ABEBB6E87928}"/>
+          </ac:spMkLst>
+        </pc:spChg>
+        <pc:picChg chg="del">
+          <ac:chgData name="Ketelyn Medina" userId="4342a56e1256850b" providerId="LiveId" clId="{8082530A-CFC6-4E58-BB3B-959648091726}" dt="2024-05-04T14:12:44.146" v="515" actId="478"/>
+          <ac:picMkLst>
+            <pc:docMk/>
+            <pc:sldMk cId="230846951" sldId="262"/>
+            <ac:picMk id="9" creationId="{D95693EB-31CE-4CCC-6D95-0ADBD48BD569}"/>
+          </ac:picMkLst>
+        </pc:picChg>
+      </pc:sldChg>
+      <pc:sldChg chg="new del">
+        <pc:chgData name="Ketelyn Medina" userId="4342a56e1256850b" providerId="LiveId" clId="{8082530A-CFC6-4E58-BB3B-959648091726}" dt="2024-05-04T14:08:04.650" v="342" actId="680"/>
+        <pc:sldMkLst>
+          <pc:docMk/>
+          <pc:sldMk cId="1740905945" sldId="262"/>
+        </pc:sldMkLst>
+      </pc:sldChg>
+      <pc:sldChg chg="addSp delSp modSp add mod">
+        <pc:chgData name="Ketelyn Medina" userId="4342a56e1256850b" providerId="LiveId" clId="{8082530A-CFC6-4E58-BB3B-959648091726}" dt="2024-05-05T18:24:04.001" v="1152" actId="478"/>
+        <pc:sldMkLst>
+          <pc:docMk/>
+          <pc:sldMk cId="1617020131" sldId="263"/>
+        </pc:sldMkLst>
+        <pc:spChg chg="mod">
+          <ac:chgData name="Ketelyn Medina" userId="4342a56e1256850b" providerId="LiveId" clId="{8082530A-CFC6-4E58-BB3B-959648091726}" dt="2024-05-05T18:23:46.739" v="1136" actId="20577"/>
+          <ac:spMkLst>
+            <pc:docMk/>
+            <pc:sldMk cId="1617020131" sldId="263"/>
+            <ac:spMk id="2" creationId="{4513B46C-8276-1518-93A5-526E041946FC}"/>
+          </ac:spMkLst>
+        </pc:spChg>
+        <pc:spChg chg="del">
+          <ac:chgData name="Ketelyn Medina" userId="4342a56e1256850b" providerId="LiveId" clId="{8082530A-CFC6-4E58-BB3B-959648091726}" dt="2024-05-05T18:23:50.534" v="1137" actId="478"/>
+          <ac:spMkLst>
+            <pc:docMk/>
+            <pc:sldMk cId="1617020131" sldId="263"/>
+            <ac:spMk id="3" creationId="{5161CDC8-FF07-0AD5-6381-DD5D23BA23D4}"/>
+          </ac:spMkLst>
+        </pc:spChg>
+        <pc:spChg chg="mod">
+          <ac:chgData name="Ketelyn Medina" userId="4342a56e1256850b" providerId="LiveId" clId="{8082530A-CFC6-4E58-BB3B-959648091726}" dt="2024-05-05T18:23:53.919" v="1141" actId="20577"/>
+          <ac:spMkLst>
+            <pc:docMk/>
+            <pc:sldMk cId="1617020131" sldId="263"/>
+            <ac:spMk id="4" creationId="{69653506-C7EF-3417-0623-767B75632118}"/>
+          </ac:spMkLst>
+        </pc:spChg>
+        <pc:spChg chg="add del mod">
+          <ac:chgData name="Ketelyn Medina" userId="4342a56e1256850b" providerId="LiveId" clId="{8082530A-CFC6-4E58-BB3B-959648091726}" dt="2024-05-05T18:23:52.001" v="1138" actId="478"/>
+          <ac:spMkLst>
+            <pc:docMk/>
+            <pc:sldMk cId="1617020131" sldId="263"/>
+            <ac:spMk id="7" creationId="{E3E16FFC-4AD1-3BBB-80F3-C2BEB11C70F3}"/>
+          </ac:spMkLst>
+        </pc:spChg>
+        <pc:spChg chg="del mod">
+          <ac:chgData name="Ketelyn Medina" userId="4342a56e1256850b" providerId="LiveId" clId="{8082530A-CFC6-4E58-BB3B-959648091726}" dt="2024-05-05T18:23:56.504" v="1144" actId="478"/>
+          <ac:spMkLst>
+            <pc:docMk/>
+            <pc:sldMk cId="1617020131" sldId="263"/>
+            <ac:spMk id="8" creationId="{C3369C1D-136B-54E8-3981-7C2EDC2AFA7F}"/>
+          </ac:spMkLst>
+        </pc:spChg>
+        <pc:spChg chg="del">
+          <ac:chgData name="Ketelyn Medina" userId="4342a56e1256850b" providerId="LiveId" clId="{8082530A-CFC6-4E58-BB3B-959648091726}" dt="2024-05-05T18:24:04.001" v="1152" actId="478"/>
+          <ac:spMkLst>
+            <pc:docMk/>
+            <pc:sldMk cId="1617020131" sldId="263"/>
+            <ac:spMk id="11" creationId="{F1FD733B-1603-551D-9FC5-27D724BC858D}"/>
+          </ac:spMkLst>
+        </pc:spChg>
+        <pc:spChg chg="del">
+          <ac:chgData name="Ketelyn Medina" userId="4342a56e1256850b" providerId="LiveId" clId="{8082530A-CFC6-4E58-BB3B-959648091726}" dt="2024-05-05T18:24:02.664" v="1151" actId="478"/>
+          <ac:spMkLst>
+            <pc:docMk/>
+            <pc:sldMk cId="1617020131" sldId="263"/>
+            <ac:spMk id="13" creationId="{167A2AA1-3F45-D352-67E0-D09C55F5E60F}"/>
+          </ac:spMkLst>
+        </pc:spChg>
+        <pc:spChg chg="del mod">
+          <ac:chgData name="Ketelyn Medina" userId="4342a56e1256850b" providerId="LiveId" clId="{8082530A-CFC6-4E58-BB3B-959648091726}" dt="2024-05-05T18:24:01.548" v="1150" actId="478"/>
+          <ac:spMkLst>
+            <pc:docMk/>
+            <pc:sldMk cId="1617020131" sldId="263"/>
+            <ac:spMk id="15" creationId="{7AE60127-37B0-DBA1-1337-4D79A0CD6557}"/>
+          </ac:spMkLst>
+        </pc:spChg>
+        <pc:spChg chg="del mod">
+          <ac:chgData name="Ketelyn Medina" userId="4342a56e1256850b" providerId="LiveId" clId="{8082530A-CFC6-4E58-BB3B-959648091726}" dt="2024-05-05T18:23:53.307" v="1140" actId="478"/>
+          <ac:spMkLst>
+            <pc:docMk/>
+            <pc:sldMk cId="1617020131" sldId="263"/>
+            <ac:spMk id="16" creationId="{6ACF3904-1EFF-12EA-8577-2DA04B669099}"/>
+          </ac:spMkLst>
+        </pc:spChg>
+        <pc:grpChg chg="del">
+          <ac:chgData name="Ketelyn Medina" userId="4342a56e1256850b" providerId="LiveId" clId="{8082530A-CFC6-4E58-BB3B-959648091726}" dt="2024-05-05T18:23:54.669" v="1142" actId="478"/>
+          <ac:grpSpMkLst>
+            <pc:docMk/>
+            <pc:sldMk cId="1617020131" sldId="263"/>
+            <ac:grpSpMk id="5" creationId="{E5B1075F-FBE6-707B-4B87-408F2FC21B93}"/>
+          </ac:grpSpMkLst>
+        </pc:grpChg>
+        <pc:picChg chg="del">
+          <ac:chgData name="Ketelyn Medina" userId="4342a56e1256850b" providerId="LiveId" clId="{8082530A-CFC6-4E58-BB3B-959648091726}" dt="2024-05-05T18:23:57.634" v="1146" actId="478"/>
+          <ac:picMkLst>
+            <pc:docMk/>
+            <pc:sldMk cId="1617020131" sldId="263"/>
+            <ac:picMk id="10" creationId="{38166DD5-B561-E941-B9DF-B7A5CFF0422C}"/>
+          </ac:picMkLst>
+        </pc:picChg>
+        <pc:picChg chg="del">
+          <ac:chgData name="Ketelyn Medina" userId="4342a56e1256850b" providerId="LiveId" clId="{8082530A-CFC6-4E58-BB3B-959648091726}" dt="2024-05-05T18:23:58.074" v="1147" actId="478"/>
+          <ac:picMkLst>
+            <pc:docMk/>
+            <pc:sldMk cId="1617020131" sldId="263"/>
+            <ac:picMk id="12" creationId="{7923D9CC-8864-F46E-68B5-1C96138C1508}"/>
+          </ac:picMkLst>
+        </pc:picChg>
+        <pc:picChg chg="del">
+          <ac:chgData name="Ketelyn Medina" userId="4342a56e1256850b" providerId="LiveId" clId="{8082530A-CFC6-4E58-BB3B-959648091726}" dt="2024-05-05T18:23:58.476" v="1148" actId="478"/>
+          <ac:picMkLst>
+            <pc:docMk/>
+            <pc:sldMk cId="1617020131" sldId="263"/>
+            <ac:picMk id="14" creationId="{E9F3F5D2-3972-8075-51D6-085620EFBB7D}"/>
+          </ac:picMkLst>
+        </pc:picChg>
+        <pc:picChg chg="del">
+          <ac:chgData name="Ketelyn Medina" userId="4342a56e1256850b" providerId="LiveId" clId="{8082530A-CFC6-4E58-BB3B-959648091726}" dt="2024-05-05T18:23:57.169" v="1145" actId="478"/>
+          <ac:picMkLst>
+            <pc:docMk/>
+            <pc:sldMk cId="1617020131" sldId="263"/>
+            <ac:picMk id="1028" creationId="{B01FDC99-A2BA-A7F5-027F-D811DE509FC7}"/>
+          </ac:picMkLst>
+        </pc:picChg>
+      </pc:sldChg>
+      <pc:sldChg chg="new del">
+        <pc:chgData name="Ketelyn Medina" userId="4342a56e1256850b" providerId="LiveId" clId="{8082530A-CFC6-4E58-BB3B-959648091726}" dt="2024-05-04T14:08:04.106" v="341" actId="680"/>
+        <pc:sldMkLst>
+          <pc:docMk/>
+          <pc:sldMk cId="3809829661" sldId="263"/>
+        </pc:sldMkLst>
+      </pc:sldChg>
+      <pc:sldChg chg="new del">
+        <pc:chgData name="Ketelyn Medina" userId="4342a56e1256850b" providerId="LiveId" clId="{8082530A-CFC6-4E58-BB3B-959648091726}" dt="2024-05-04T14:08:03.877" v="340" actId="680"/>
+        <pc:sldMkLst>
+          <pc:docMk/>
+          <pc:sldMk cId="2286535172" sldId="264"/>
+        </pc:sldMkLst>
+      </pc:sldChg>
+      <pc:sldChg chg="modSp add mod">
+        <pc:chgData name="Ketelyn Medina" userId="4342a56e1256850b" providerId="LiveId" clId="{8082530A-CFC6-4E58-BB3B-959648091726}" dt="2024-05-05T18:24:16.966" v="1156" actId="20577"/>
+        <pc:sldMkLst>
+          <pc:docMk/>
+          <pc:sldMk cId="3028234208" sldId="264"/>
+        </pc:sldMkLst>
+        <pc:spChg chg="mod">
+          <ac:chgData name="Ketelyn Medina" userId="4342a56e1256850b" providerId="LiveId" clId="{8082530A-CFC6-4E58-BB3B-959648091726}" dt="2024-05-05T18:24:16.966" v="1156" actId="20577"/>
+          <ac:spMkLst>
+            <pc:docMk/>
+            <pc:sldMk cId="3028234208" sldId="264"/>
+            <ac:spMk id="2" creationId="{4513B46C-8276-1518-93A5-526E041946FC}"/>
+          </ac:spMkLst>
+        </pc:spChg>
+      </pc:sldChg>
+      <pc:sldChg chg="modSp add mod">
+        <pc:chgData name="Ketelyn Medina" userId="4342a56e1256850b" providerId="LiveId" clId="{8082530A-CFC6-4E58-BB3B-959648091726}" dt="2024-05-05T18:24:38.894" v="1161" actId="20577"/>
+        <pc:sldMkLst>
+          <pc:docMk/>
+          <pc:sldMk cId="4091252498" sldId="265"/>
+        </pc:sldMkLst>
+        <pc:spChg chg="mod">
+          <ac:chgData name="Ketelyn Medina" userId="4342a56e1256850b" providerId="LiveId" clId="{8082530A-CFC6-4E58-BB3B-959648091726}" dt="2024-05-05T18:24:38.894" v="1161" actId="20577"/>
+          <ac:spMkLst>
+            <pc:docMk/>
+            <pc:sldMk cId="4091252498" sldId="265"/>
+            <ac:spMk id="2" creationId="{4513B46C-8276-1518-93A5-526E041946FC}"/>
+          </ac:spMkLst>
+        </pc:spChg>
+      </pc:sldChg>
+      <pc:sldChg chg="addSp delSp modSp add mod">
+        <pc:chgData name="Ketelyn Medina" userId="4342a56e1256850b" providerId="LiveId" clId="{8082530A-CFC6-4E58-BB3B-959648091726}" dt="2024-05-05T18:33:27.367" v="1565" actId="1036"/>
+        <pc:sldMkLst>
+          <pc:docMk/>
+          <pc:sldMk cId="3975286133" sldId="266"/>
+        </pc:sldMkLst>
+        <pc:spChg chg="del">
+          <ac:chgData name="Ketelyn Medina" userId="4342a56e1256850b" providerId="LiveId" clId="{8082530A-CFC6-4E58-BB3B-959648091726}" dt="2024-05-05T18:25:21.190" v="1163" actId="478"/>
+          <ac:spMkLst>
+            <pc:docMk/>
+            <pc:sldMk cId="3975286133" sldId="266"/>
+            <ac:spMk id="2" creationId="{4513B46C-8276-1518-93A5-526E041946FC}"/>
+          </ac:spMkLst>
+        </pc:spChg>
+        <pc:spChg chg="add del mod">
+          <ac:chgData name="Ketelyn Medina" userId="4342a56e1256850b" providerId="LiveId" clId="{8082530A-CFC6-4E58-BB3B-959648091726}" dt="2024-05-05T18:25:23.517" v="1165" actId="478"/>
+          <ac:spMkLst>
+            <pc:docMk/>
+            <pc:sldMk cId="3975286133" sldId="266"/>
+            <ac:spMk id="4" creationId="{A3E6308A-E21D-DBB3-7B47-326839441D86}"/>
+          </ac:spMkLst>
+        </pc:spChg>
+        <pc:spChg chg="add del mod">
+          <ac:chgData name="Ketelyn Medina" userId="4342a56e1256850b" providerId="LiveId" clId="{8082530A-CFC6-4E58-BB3B-959648091726}" dt="2024-05-05T18:26:04.139" v="1170" actId="478"/>
+          <ac:spMkLst>
+            <pc:docMk/>
+            <pc:sldMk cId="3975286133" sldId="266"/>
+            <ac:spMk id="5" creationId="{CD5D0DFA-825B-6567-A3C1-35BF681A368D}"/>
+          </ac:spMkLst>
+        </pc:spChg>
+        <pc:spChg chg="add mod">
+          <ac:chgData name="Ketelyn Medina" userId="4342a56e1256850b" providerId="LiveId" clId="{8082530A-CFC6-4E58-BB3B-959648091726}" dt="2024-05-05T18:29:51.240" v="1210" actId="20577"/>
+          <ac:spMkLst>
+            <pc:docMk/>
+            <pc:sldMk cId="3975286133" sldId="266"/>
+            <ac:spMk id="6" creationId="{38563621-48BD-35F9-6511-8CD4F0AB0255}"/>
+          </ac:spMkLst>
+        </pc:spChg>
+        <pc:spChg chg="add mod ord">
+          <ac:chgData name="Ketelyn Medina" userId="4342a56e1256850b" providerId="LiveId" clId="{8082530A-CFC6-4E58-BB3B-959648091726}" dt="2024-05-05T18:29:42.334" v="1200" actId="1076"/>
+          <ac:spMkLst>
+            <pc:docMk/>
+            <pc:sldMk cId="3975286133" sldId="266"/>
+            <ac:spMk id="7" creationId="{89591122-9BDA-B1DC-83C5-582FBE8040DE}"/>
+          </ac:spMkLst>
+        </pc:spChg>
+        <pc:spChg chg="add mod">
+          <ac:chgData name="Ketelyn Medina" userId="4342a56e1256850b" providerId="LiveId" clId="{8082530A-CFC6-4E58-BB3B-959648091726}" dt="2024-05-05T18:33:27.367" v="1565" actId="1036"/>
+          <ac:spMkLst>
+            <pc:docMk/>
+            <pc:sldMk cId="3975286133" sldId="266"/>
+            <ac:spMk id="8" creationId="{11E245A8-0589-E184-57BD-64071F3E7DBC}"/>
+          </ac:spMkLst>
+        </pc:spChg>
+        <pc:spChg chg="add mod">
+          <ac:chgData name="Ketelyn Medina" userId="4342a56e1256850b" providerId="LiveId" clId="{8082530A-CFC6-4E58-BB3B-959648091726}" dt="2024-05-05T18:32:49.671" v="1497" actId="1076"/>
+          <ac:spMkLst>
+            <pc:docMk/>
+            <pc:sldMk cId="3975286133" sldId="266"/>
+            <ac:spMk id="9" creationId="{F8E54ECC-C108-E4E1-1D93-A126BC5205E4}"/>
+          </ac:spMkLst>
+        </pc:spChg>
+        <pc:spChg chg="add mod">
+          <ac:chgData name="Ketelyn Medina" userId="4342a56e1256850b" providerId="LiveId" clId="{8082530A-CFC6-4E58-BB3B-959648091726}" dt="2024-05-05T18:33:23.089" v="1557" actId="1035"/>
+          <ac:spMkLst>
+            <pc:docMk/>
+            <pc:sldMk cId="3975286133" sldId="266"/>
+            <ac:spMk id="10" creationId="{5E20E90A-338E-1E1B-6BED-86BE1E283FBB}"/>
+          </ac:spMkLst>
+        </pc:spChg>
+      </pc:sldChg>
+      <pc:sldChg chg="addSp modSp add mod">
+        <pc:chgData name="Ketelyn Medina" userId="4342a56e1256850b" providerId="LiveId" clId="{8082530A-CFC6-4E58-BB3B-959648091726}" dt="2024-05-05T18:41:15.111" v="2019" actId="14100"/>
+        <pc:sldMkLst>
+          <pc:docMk/>
+          <pc:sldMk cId="763755075" sldId="267"/>
+        </pc:sldMkLst>
+        <pc:spChg chg="add mod">
+          <ac:chgData name="Ketelyn Medina" userId="4342a56e1256850b" providerId="LiveId" clId="{8082530A-CFC6-4E58-BB3B-959648091726}" dt="2024-05-05T18:40:45.660" v="2003" actId="1035"/>
+          <ac:spMkLst>
+            <pc:docMk/>
+            <pc:sldMk cId="763755075" sldId="267"/>
+            <ac:spMk id="2" creationId="{0698AE17-AC4B-111C-2E40-07BD8BEF3A6F}"/>
+          </ac:spMkLst>
+        </pc:spChg>
+        <pc:spChg chg="add mod">
+          <ac:chgData name="Ketelyn Medina" userId="4342a56e1256850b" providerId="LiveId" clId="{8082530A-CFC6-4E58-BB3B-959648091726}" dt="2024-05-05T18:41:11.181" v="2018" actId="1036"/>
+          <ac:spMkLst>
+            <pc:docMk/>
+            <pc:sldMk cId="763755075" sldId="267"/>
+            <ac:spMk id="3" creationId="{891B84C8-505A-FFFE-DA01-46ADF443374B}"/>
+          </ac:spMkLst>
+        </pc:spChg>
+        <pc:spChg chg="add mod ord">
+          <ac:chgData name="Ketelyn Medina" userId="4342a56e1256850b" providerId="LiveId" clId="{8082530A-CFC6-4E58-BB3B-959648091726}" dt="2024-05-05T18:35:47.262" v="1594" actId="167"/>
+          <ac:spMkLst>
+            <pc:docMk/>
+            <pc:sldMk cId="763755075" sldId="267"/>
+            <ac:spMk id="4" creationId="{D61A0B57-C428-45B5-84A6-0C5ACB69650B}"/>
+          </ac:spMkLst>
+        </pc:spChg>
+        <pc:spChg chg="add mod">
+          <ac:chgData name="Ketelyn Medina" userId="4342a56e1256850b" providerId="LiveId" clId="{8082530A-CFC6-4E58-BB3B-959648091726}" dt="2024-05-05T18:41:15.111" v="2019" actId="14100"/>
+          <ac:spMkLst>
+            <pc:docMk/>
+            <pc:sldMk cId="763755075" sldId="267"/>
+            <ac:spMk id="5" creationId="{7F6C1108-6AB0-FD06-EE7C-072DC9BA704B}"/>
+          </ac:spMkLst>
+        </pc:spChg>
+        <pc:spChg chg="mod">
+          <ac:chgData name="Ketelyn Medina" userId="4342a56e1256850b" providerId="LiveId" clId="{8082530A-CFC6-4E58-BB3B-959648091726}" dt="2024-05-05T18:36:37.714" v="1605" actId="1076"/>
+          <ac:spMkLst>
+            <pc:docMk/>
+            <pc:sldMk cId="763755075" sldId="267"/>
+            <ac:spMk id="6" creationId="{38563621-48BD-35F9-6511-8CD4F0AB0255}"/>
+          </ac:spMkLst>
+        </pc:spChg>
+        <pc:spChg chg="mod ord">
+          <ac:chgData name="Ketelyn Medina" userId="4342a56e1256850b" providerId="LiveId" clId="{8082530A-CFC6-4E58-BB3B-959648091726}" dt="2024-05-05T18:36:58.163" v="1612" actId="1076"/>
+          <ac:spMkLst>
+            <pc:docMk/>
+            <pc:sldMk cId="763755075" sldId="267"/>
+            <ac:spMk id="7" creationId="{89591122-9BDA-B1DC-83C5-582FBE8040DE}"/>
+          </ac:spMkLst>
+        </pc:spChg>
+        <pc:spChg chg="mod">
+          <ac:chgData name="Ketelyn Medina" userId="4342a56e1256850b" providerId="LiveId" clId="{8082530A-CFC6-4E58-BB3B-959648091726}" dt="2024-05-05T18:36:42.425" v="1607" actId="1076"/>
+          <ac:spMkLst>
+            <pc:docMk/>
+            <pc:sldMk cId="763755075" sldId="267"/>
+            <ac:spMk id="8" creationId="{11E245A8-0589-E184-57BD-64071F3E7DBC}"/>
+          </ac:spMkLst>
+        </pc:spChg>
+        <pc:spChg chg="add mod">
+          <ac:chgData name="Ketelyn Medina" userId="4342a56e1256850b" providerId="LiveId" clId="{8082530A-CFC6-4E58-BB3B-959648091726}" dt="2024-05-05T18:40:58.671" v="2011" actId="14100"/>
+          <ac:spMkLst>
+            <pc:docMk/>
+            <pc:sldMk cId="763755075" sldId="267"/>
+            <ac:spMk id="11" creationId="{EC1031B5-4455-A8A1-E498-E567D02E32B1}"/>
+          </ac:spMkLst>
+        </pc:spChg>
+        <pc:spChg chg="add mod">
+          <ac:chgData name="Ketelyn Medina" userId="4342a56e1256850b" providerId="LiveId" clId="{8082530A-CFC6-4E58-BB3B-959648091726}" dt="2024-05-05T18:36:42.772" v="1608"/>
+          <ac:spMkLst>
+            <pc:docMk/>
+            <pc:sldMk cId="763755075" sldId="267"/>
+            <ac:spMk id="12" creationId="{A0644218-2919-E721-A878-7EB776E4E00A}"/>
+          </ac:spMkLst>
+        </pc:spChg>
+        <pc:spChg chg="add mod">
+          <ac:chgData name="Ketelyn Medina" userId="4342a56e1256850b" providerId="LiveId" clId="{8082530A-CFC6-4E58-BB3B-959648091726}" dt="2024-05-05T18:41:04.718" v="2012" actId="1076"/>
+          <ac:spMkLst>
+            <pc:docMk/>
+            <pc:sldMk cId="763755075" sldId="267"/>
+            <ac:spMk id="13" creationId="{083A9691-7D67-9B57-2076-BD83D12C11C7}"/>
+          </ac:spMkLst>
+        </pc:spChg>
+      </pc:sldChg>
+    </pc:docChg>
+  </pc:docChgLst>
   <pc:docChgLst>
     <pc:chgData name="VAGNER JOSÉ DI BENEDETTO VILLELA DE ANDRADE ." userId="39095851-9987-426c-992c-64b07dc30090" providerId="ADAL" clId="{5B440EA2-DE11-412C-A505-B0319508B54D}"/>
     <pc:docChg chg="undo custSel addSld modSld">
@@ -752,7 +1610,7 @@
           <a:p>
             <a:fld id="{C593B007-2F9B-4FAC-9C9C-D9E65130C08A}" type="datetimeFigureOut">
               <a:rPr lang="pt-BR" smtClean="0"/>
-              <a:t>04/05/2024</a:t>
+              <a:t>05/05/2024</a:t>
             </a:fld>
             <a:endParaRPr lang="pt-BR"/>
           </a:p>
@@ -950,7 +1808,7 @@
           <a:p>
             <a:fld id="{C593B007-2F9B-4FAC-9C9C-D9E65130C08A}" type="datetimeFigureOut">
               <a:rPr lang="pt-BR" smtClean="0"/>
-              <a:t>04/05/2024</a:t>
+              <a:t>05/05/2024</a:t>
             </a:fld>
             <a:endParaRPr lang="pt-BR"/>
           </a:p>
@@ -1158,7 +2016,7 @@
           <a:p>
             <a:fld id="{C593B007-2F9B-4FAC-9C9C-D9E65130C08A}" type="datetimeFigureOut">
               <a:rPr lang="pt-BR" smtClean="0"/>
-              <a:t>04/05/2024</a:t>
+              <a:t>05/05/2024</a:t>
             </a:fld>
             <a:endParaRPr lang="pt-BR"/>
           </a:p>
@@ -1356,7 +2214,7 @@
           <a:p>
             <a:fld id="{C593B007-2F9B-4FAC-9C9C-D9E65130C08A}" type="datetimeFigureOut">
               <a:rPr lang="pt-BR" smtClean="0"/>
-              <a:t>04/05/2024</a:t>
+              <a:t>05/05/2024</a:t>
             </a:fld>
             <a:endParaRPr lang="pt-BR"/>
           </a:p>
@@ -1631,7 +2489,7 @@
           <a:p>
             <a:fld id="{C593B007-2F9B-4FAC-9C9C-D9E65130C08A}" type="datetimeFigureOut">
               <a:rPr lang="pt-BR" smtClean="0"/>
-              <a:t>04/05/2024</a:t>
+              <a:t>05/05/2024</a:t>
             </a:fld>
             <a:endParaRPr lang="pt-BR"/>
           </a:p>
@@ -1896,7 +2754,7 @@
           <a:p>
             <a:fld id="{C593B007-2F9B-4FAC-9C9C-D9E65130C08A}" type="datetimeFigureOut">
               <a:rPr lang="pt-BR" smtClean="0"/>
-              <a:t>04/05/2024</a:t>
+              <a:t>05/05/2024</a:t>
             </a:fld>
             <a:endParaRPr lang="pt-BR"/>
           </a:p>
@@ -2308,7 +3166,7 @@
           <a:p>
             <a:fld id="{C593B007-2F9B-4FAC-9C9C-D9E65130C08A}" type="datetimeFigureOut">
               <a:rPr lang="pt-BR" smtClean="0"/>
-              <a:t>04/05/2024</a:t>
+              <a:t>05/05/2024</a:t>
             </a:fld>
             <a:endParaRPr lang="pt-BR"/>
           </a:p>
@@ -2449,7 +3307,7 @@
           <a:p>
             <a:fld id="{C593B007-2F9B-4FAC-9C9C-D9E65130C08A}" type="datetimeFigureOut">
               <a:rPr lang="pt-BR" smtClean="0"/>
-              <a:t>04/05/2024</a:t>
+              <a:t>05/05/2024</a:t>
             </a:fld>
             <a:endParaRPr lang="pt-BR"/>
           </a:p>
@@ -2562,7 +3420,7 @@
           <a:p>
             <a:fld id="{C593B007-2F9B-4FAC-9C9C-D9E65130C08A}" type="datetimeFigureOut">
               <a:rPr lang="pt-BR" smtClean="0"/>
-              <a:t>04/05/2024</a:t>
+              <a:t>05/05/2024</a:t>
             </a:fld>
             <a:endParaRPr lang="pt-BR"/>
           </a:p>
@@ -2873,7 +3731,7 @@
           <a:p>
             <a:fld id="{C593B007-2F9B-4FAC-9C9C-D9E65130C08A}" type="datetimeFigureOut">
               <a:rPr lang="pt-BR" smtClean="0"/>
-              <a:t>04/05/2024</a:t>
+              <a:t>05/05/2024</a:t>
             </a:fld>
             <a:endParaRPr lang="pt-BR"/>
           </a:p>
@@ -3161,7 +4019,7 @@
           <a:p>
             <a:fld id="{C593B007-2F9B-4FAC-9C9C-D9E65130C08A}" type="datetimeFigureOut">
               <a:rPr lang="pt-BR" smtClean="0"/>
-              <a:t>04/05/2024</a:t>
+              <a:t>05/05/2024</a:t>
             </a:fld>
             <a:endParaRPr lang="pt-BR"/>
           </a:p>
@@ -3402,7 +4260,7 @@
           <a:p>
             <a:fld id="{C593B007-2F9B-4FAC-9C9C-D9E65130C08A}" type="datetimeFigureOut">
               <a:rPr lang="pt-BR" smtClean="0"/>
-              <a:t>04/05/2024</a:t>
+              <a:t>05/05/2024</a:t>
             </a:fld>
             <a:endParaRPr lang="pt-BR"/>
           </a:p>
@@ -3807,9 +4665,13 @@
   <p:cSld>
     <p:bg>
       <p:bgPr>
-        <a:solidFill>
-          <a:schemeClr val="bg1"/>
-        </a:solidFill>
+        <a:blipFill dpi="0" rotWithShape="1">
+          <a:blip r:embed="rId2">
+            <a:lum/>
+          </a:blip>
+          <a:srcRect/>
+          <a:tile tx="0" ty="0" sx="100000" sy="100000" flip="none" algn="tl"/>
+        </a:blipFill>
         <a:effectLst/>
       </p:bgPr>
     </p:bg>
@@ -3902,7 +4764,8 @@
           <p:nvPr/>
         </p:nvPicPr>
         <p:blipFill rotWithShape="1">
-          <a:blip r:embed="rId2">
+          <a:blip r:embed="rId3">
+            <a:alphaModFix amt="85000"/>
             <a:extLst>
               <a:ext uri="{28A0092B-C50C-407E-A947-70E740481C1C}">
                 <a14:useLocalDpi xmlns:a14="http://schemas.microsoft.com/office/drawing/2010/main" val="0"/>
@@ -4261,38 +5124,6 @@
       </p:sp>
       <p:sp>
         <p:nvSpPr>
-          <p:cNvPr id="5" name="CaixaDeTexto 4">
-            <a:extLst>
-              <a:ext uri="{FF2B5EF4-FFF2-40B4-BE49-F238E27FC236}">
-                <a16:creationId xmlns:a16="http://schemas.microsoft.com/office/drawing/2014/main" id="{F9E05431-9436-DE25-E0FC-AA20248FE1F2}"/>
-              </a:ext>
-            </a:extLst>
-          </p:cNvPr>
-          <p:cNvSpPr txBox="1"/>
-          <p:nvPr/>
-        </p:nvSpPr>
-        <p:spPr>
-          <a:xfrm>
-            <a:off x="2782529" y="3232043"/>
-            <a:ext cx="6272980" cy="369332"/>
-          </a:xfrm>
-          <a:prstGeom prst="rect">
-            <a:avLst/>
-          </a:prstGeom>
-          <a:noFill/>
-        </p:spPr>
-        <p:txBody>
-          <a:bodyPr wrap="square">
-            <a:spAutoFit/>
-          </a:bodyPr>
-          <a:lstStyle/>
-          <a:p>
-            <a:endParaRPr lang="pt-BR" dirty="0"/>
-          </a:p>
-        </p:txBody>
-      </p:sp>
-      <p:sp>
-        <p:nvSpPr>
           <p:cNvPr id="6" name="Rectangle 1">
             <a:extLst>
               <a:ext uri="{FF2B5EF4-FFF2-40B4-BE49-F238E27FC236}">
@@ -4370,6 +5201,192 @@
   <p:clrMapOvr>
     <a:masterClrMapping/>
   </p:clrMapOvr>
+  <p:transition spd="slow">
+    <p:wipe dir="r"/>
+  </p:transition>
+</p:sld>
+</file>
+
+<file path=ppt/slides/slide10.xml><?xml version="1.0" encoding="utf-8"?>
+<p:sld xmlns:a="http://schemas.openxmlformats.org/drawingml/2006/main" xmlns:r="http://schemas.openxmlformats.org/officeDocument/2006/relationships" xmlns:p="http://schemas.openxmlformats.org/presentationml/2006/main">
+  <p:cSld>
+    <p:bg>
+      <p:bgPr>
+        <a:solidFill>
+          <a:srgbClr val="E63946"/>
+        </a:solidFill>
+        <a:effectLst/>
+      </p:bgPr>
+    </p:bg>
+    <p:spTree>
+      <p:nvGrpSpPr>
+        <p:cNvPr id="1" name=""/>
+        <p:cNvGrpSpPr/>
+        <p:nvPr/>
+      </p:nvGrpSpPr>
+      <p:grpSpPr>
+        <a:xfrm>
+          <a:off x="0" y="0"/>
+          <a:ext cx="0" cy="0"/>
+          <a:chOff x="0" y="0"/>
+          <a:chExt cx="0" cy="0"/>
+        </a:xfrm>
+      </p:grpSpPr>
+    </p:spTree>
+    <p:extLst>
+      <p:ext uri="{BB962C8B-B14F-4D97-AF65-F5344CB8AC3E}">
+        <p14:creationId xmlns:p14="http://schemas.microsoft.com/office/powerpoint/2010/main" val="3985326264"/>
+      </p:ext>
+    </p:extLst>
+  </p:cSld>
+  <p:clrMapOvr>
+    <a:masterClrMapping/>
+  </p:clrMapOvr>
+</p:sld>
+</file>
+
+<file path=ppt/slides/slide11.xml><?xml version="1.0" encoding="utf-8"?>
+<p:sld xmlns:a="http://schemas.openxmlformats.org/drawingml/2006/main" xmlns:r="http://schemas.openxmlformats.org/officeDocument/2006/relationships" xmlns:p="http://schemas.openxmlformats.org/presentationml/2006/main">
+  <p:cSld>
+    <p:bg>
+      <p:bgPr>
+        <a:solidFill>
+          <a:srgbClr val="EDF2F4"/>
+        </a:solidFill>
+        <a:effectLst/>
+      </p:bgPr>
+    </p:bg>
+    <p:spTree>
+      <p:nvGrpSpPr>
+        <p:cNvPr id="1" name=""/>
+        <p:cNvGrpSpPr/>
+        <p:nvPr/>
+      </p:nvGrpSpPr>
+      <p:grpSpPr>
+        <a:xfrm>
+          <a:off x="0" y="0"/>
+          <a:ext cx="0" cy="0"/>
+          <a:chOff x="0" y="0"/>
+          <a:chExt cx="0" cy="0"/>
+        </a:xfrm>
+      </p:grpSpPr>
+      <p:pic>
+        <p:nvPicPr>
+          <p:cNvPr id="2" name="Imagem 1" descr="Uma imagem contendo no interior, mesa, computador, grupo&#10;&#10;Descrição gerada automaticamente">
+            <a:extLst>
+              <a:ext uri="{FF2B5EF4-FFF2-40B4-BE49-F238E27FC236}">
+                <a16:creationId xmlns:a16="http://schemas.microsoft.com/office/drawing/2014/main" id="{A0F43605-50CF-2F52-901C-5567AD23653B}"/>
+              </a:ext>
+            </a:extLst>
+          </p:cNvPr>
+          <p:cNvPicPr>
+            <a:picLocks noChangeAspect="1"/>
+          </p:cNvPicPr>
+          <p:nvPr/>
+        </p:nvPicPr>
+        <p:blipFill rotWithShape="1">
+          <a:blip r:embed="rId2">
+            <a:alphaModFix amt="20000"/>
+            <a:extLst>
+              <a:ext uri="{28A0092B-C50C-407E-A947-70E740481C1C}">
+                <a14:useLocalDpi xmlns:a14="http://schemas.microsoft.com/office/drawing/2010/main" val="0"/>
+              </a:ext>
+            </a:extLst>
+          </a:blip>
+          <a:srcRect t="18522" r="9091" b="33470"/>
+          <a:stretch/>
+        </p:blipFill>
+        <p:spPr>
+          <a:xfrm>
+            <a:off x="2913888" y="0"/>
+            <a:ext cx="9278112" cy="6857990"/>
+          </a:xfrm>
+          <a:prstGeom prst="rect">
+            <a:avLst/>
+          </a:prstGeom>
+          <a:effectLst>
+            <a:outerShdw sx="1000" sy="1000" algn="ctr" rotWithShape="0">
+              <a:srgbClr val="000000"/>
+            </a:outerShdw>
+          </a:effectLst>
+        </p:spPr>
+      </p:pic>
+      <p:sp>
+        <p:nvSpPr>
+          <p:cNvPr id="18" name="Fluxograma: Atraso 17">
+            <a:extLst>
+              <a:ext uri="{FF2B5EF4-FFF2-40B4-BE49-F238E27FC236}">
+                <a16:creationId xmlns:a16="http://schemas.microsoft.com/office/drawing/2014/main" id="{49C34B81-B234-728C-05CD-ABBE7E1BC47F}"/>
+              </a:ext>
+            </a:extLst>
+          </p:cNvPr>
+          <p:cNvSpPr/>
+          <p:nvPr/>
+        </p:nvSpPr>
+        <p:spPr>
+          <a:xfrm>
+            <a:off x="0" y="0"/>
+            <a:ext cx="5425440" cy="6858000"/>
+          </a:xfrm>
+          <a:prstGeom prst="flowChartDelay">
+            <a:avLst/>
+          </a:prstGeom>
+          <a:solidFill>
+            <a:srgbClr val="E63946"/>
+          </a:solidFill>
+          <a:ln>
+            <a:noFill/>
+          </a:ln>
+        </p:spPr>
+        <p:style>
+          <a:lnRef idx="2">
+            <a:schemeClr val="accent1">
+              <a:shade val="15000"/>
+            </a:schemeClr>
+          </a:lnRef>
+          <a:fillRef idx="1">
+            <a:schemeClr val="accent1"/>
+          </a:fillRef>
+          <a:effectRef idx="0">
+            <a:schemeClr val="accent1"/>
+          </a:effectRef>
+          <a:fontRef idx="minor">
+            <a:schemeClr val="lt1"/>
+          </a:fontRef>
+        </p:style>
+        <p:txBody>
+          <a:bodyPr rtlCol="0" anchor="ctr"/>
+          <a:lstStyle/>
+          <a:p>
+            <a:pPr algn="ctr"/>
+            <a:endParaRPr lang="pt-BR" dirty="0">
+              <a:noFill/>
+            </a:endParaRPr>
+          </a:p>
+        </p:txBody>
+      </p:sp>
+    </p:spTree>
+    <p:extLst>
+      <p:ext uri="{BB962C8B-B14F-4D97-AF65-F5344CB8AC3E}">
+        <p14:creationId xmlns:p14="http://schemas.microsoft.com/office/powerpoint/2010/main" val="936976568"/>
+      </p:ext>
+    </p:extLst>
+  </p:cSld>
+  <p:clrMapOvr>
+    <a:masterClrMapping/>
+  </p:clrMapOvr>
+  <mc:AlternateContent xmlns:mc="http://schemas.openxmlformats.org/markup-compatibility/2006" xmlns:p14="http://schemas.microsoft.com/office/powerpoint/2010/main">
+    <mc:Choice Requires="p14">
+      <p:transition spd="slow" p14:dur="1250">
+        <p:cover/>
+      </p:transition>
+    </mc:Choice>
+    <mc:Fallback xmlns="">
+      <p:transition spd="slow">
+        <p:cover/>
+      </p:transition>
+    </mc:Fallback>
+  </mc:AlternateContent>
 </p:sld>
 </file>
 
@@ -4560,21 +5577,23 @@
         </p:nvSpPr>
         <p:spPr>
           <a:xfrm>
-            <a:off x="728663" y="1115219"/>
-            <a:ext cx="5505449" cy="2387600"/>
+            <a:off x="728663" y="2661919"/>
+            <a:ext cx="2380297" cy="840899"/>
           </a:xfrm>
         </p:spPr>
         <p:txBody>
           <a:bodyPr vert="horz" lIns="91440" tIns="45720" rIns="91440" bIns="45720" rtlCol="0" anchor="b">
-            <a:normAutofit/>
+            <a:normAutofit fontScale="90000"/>
           </a:bodyPr>
           <a:lstStyle/>
           <a:p>
             <a:r>
-              <a:rPr lang="en-US" sz="5000">
+              <a:rPr lang="en-US" sz="5000" dirty="0">
                 <a:solidFill>
                   <a:schemeClr val="bg1"/>
                 </a:solidFill>
+                <a:latin typeface="Verdana" panose="020B0604030504040204" pitchFamily="34" charset="0"/>
+                <a:ea typeface="Verdana" panose="020B0604030504040204" pitchFamily="34" charset="0"/>
               </a:rPr>
               <a:t>EQUIPE</a:t>
             </a:r>
@@ -4678,6 +5697,9 @@
   <p:clrMapOvr>
     <a:masterClrMapping/>
   </p:clrMapOvr>
+  <p:transition spd="slow">
+    <p:wipe dir="r"/>
+  </p:transition>
   <p:timing>
     <p:tnLst>
       <p:par>
@@ -4776,6 +5798,14 @@
 <file path=ppt/slides/slide3.xml><?xml version="1.0" encoding="utf-8"?>
 <p:sld xmlns:a="http://schemas.openxmlformats.org/drawingml/2006/main" xmlns:r="http://schemas.openxmlformats.org/officeDocument/2006/relationships" xmlns:p="http://schemas.openxmlformats.org/presentationml/2006/main">
   <p:cSld>
+    <p:bg>
+      <p:bgPr>
+        <a:solidFill>
+          <a:schemeClr val="tx1"/>
+        </a:solidFill>
+        <a:effectLst/>
+      </p:bgPr>
+    </p:bg>
     <p:spTree>
       <p:nvGrpSpPr>
         <p:cNvPr id="1" name=""/>
@@ -4790,6 +5820,459 @@
           <a:chExt cx="0" cy="0"/>
         </a:xfrm>
       </p:grpSpPr>
+      <p:sp useBgFill="1">
+        <p:nvSpPr>
+          <p:cNvPr id="14" name="Rectangle 13">
+            <a:extLst>
+              <a:ext uri="{FF2B5EF4-FFF2-40B4-BE49-F238E27FC236}">
+                <a16:creationId xmlns:a16="http://schemas.microsoft.com/office/drawing/2014/main" id="{0671A8AE-40A1-4631-A6B8-581AFF065482}"/>
+              </a:ext>
+              <a:ext uri="{C183D7F6-B498-43B3-948B-1728B52AA6E4}">
+                <adec:decorative xmlns:adec="http://schemas.microsoft.com/office/drawing/2017/decorative" val="1"/>
+              </a:ext>
+            </a:extLst>
+          </p:cNvPr>
+          <p:cNvSpPr>
+            <a:spLocks noGrp="1" noRot="1" noChangeAspect="1" noMove="1" noResize="1" noEditPoints="1" noAdjustHandles="1" noChangeArrowheads="1" noChangeShapeType="1" noTextEdit="1"/>
+          </p:cNvSpPr>
+          <p:nvPr>
+            <p:extLst>
+              <p:ext uri="{386F3935-93C4-4BCD-93E2-E3B085C9AB24}">
+                <p16:designElem xmlns:p16="http://schemas.microsoft.com/office/powerpoint/2015/main" val="1"/>
+              </p:ext>
+            </p:extLst>
+          </p:nvPr>
+        </p:nvSpPr>
+        <p:spPr>
+          <a:xfrm>
+            <a:off x="0" y="0"/>
+            <a:ext cx="12192000" cy="6858000"/>
+          </a:xfrm>
+          <a:prstGeom prst="rect">
+            <a:avLst/>
+          </a:prstGeom>
+          <a:ln>
+            <a:noFill/>
+          </a:ln>
+        </p:spPr>
+        <p:style>
+          <a:lnRef idx="2">
+            <a:schemeClr val="accent1">
+              <a:shade val="50000"/>
+            </a:schemeClr>
+          </a:lnRef>
+          <a:fillRef idx="1">
+            <a:schemeClr val="accent1"/>
+          </a:fillRef>
+          <a:effectRef idx="0">
+            <a:schemeClr val="accent1"/>
+          </a:effectRef>
+          <a:fontRef idx="minor">
+            <a:schemeClr val="lt1"/>
+          </a:fontRef>
+        </p:style>
+        <p:txBody>
+          <a:bodyPr rtlCol="0" anchor="ctr"/>
+          <a:lstStyle/>
+          <a:p>
+            <a:pPr algn="ctr"/>
+            <a:endParaRPr lang="en-US"/>
+          </a:p>
+        </p:txBody>
+      </p:sp>
+      <p:sp>
+        <p:nvSpPr>
+          <p:cNvPr id="16" name="Rectangle 15">
+            <a:extLst>
+              <a:ext uri="{FF2B5EF4-FFF2-40B4-BE49-F238E27FC236}">
+                <a16:creationId xmlns:a16="http://schemas.microsoft.com/office/drawing/2014/main" id="{AB58EF07-17C2-48CF-ABB0-EEF1F17CB8F0}"/>
+              </a:ext>
+              <a:ext uri="{C183D7F6-B498-43B3-948B-1728B52AA6E4}">
+                <adec:decorative xmlns:adec="http://schemas.microsoft.com/office/drawing/2017/decorative" val="1"/>
+              </a:ext>
+            </a:extLst>
+          </p:cNvPr>
+          <p:cNvSpPr>
+            <a:spLocks noGrp="1" noRot="1" noChangeAspect="1" noMove="1" noResize="1" noEditPoints="1" noAdjustHandles="1" noChangeArrowheads="1" noChangeShapeType="1" noTextEdit="1"/>
+          </p:cNvSpPr>
+          <p:nvPr>
+            <p:extLst>
+              <p:ext uri="{386F3935-93C4-4BCD-93E2-E3B085C9AB24}">
+                <p16:designElem xmlns:p16="http://schemas.microsoft.com/office/powerpoint/2015/main" val="1"/>
+              </p:ext>
+            </p:extLst>
+          </p:nvPr>
+        </p:nvSpPr>
+        <p:spPr>
+          <a:xfrm>
+            <a:off x="3" y="0"/>
+            <a:ext cx="9339206" cy="6858000"/>
+          </a:xfrm>
+          <a:prstGeom prst="rect">
+            <a:avLst/>
+          </a:prstGeom>
+          <a:gradFill>
+            <a:gsLst>
+              <a:gs pos="58000">
+                <a:schemeClr val="tx1"/>
+              </a:gs>
+              <a:gs pos="33000">
+                <a:schemeClr val="tx1">
+                  <a:alpha val="64000"/>
+                </a:schemeClr>
+              </a:gs>
+              <a:gs pos="0">
+                <a:schemeClr val="tx1">
+                  <a:alpha val="0"/>
+                </a:schemeClr>
+              </a:gs>
+              <a:gs pos="100000">
+                <a:schemeClr val="tx1"/>
+              </a:gs>
+            </a:gsLst>
+            <a:lin ang="10800000" scaled="0"/>
+          </a:gradFill>
+          <a:ln>
+            <a:noFill/>
+          </a:ln>
+        </p:spPr>
+        <p:style>
+          <a:lnRef idx="2">
+            <a:schemeClr val="accent1">
+              <a:shade val="50000"/>
+            </a:schemeClr>
+          </a:lnRef>
+          <a:fillRef idx="1">
+            <a:schemeClr val="accent1"/>
+          </a:fillRef>
+          <a:effectRef idx="0">
+            <a:schemeClr val="accent1"/>
+          </a:effectRef>
+          <a:fontRef idx="minor">
+            <a:schemeClr val="lt1"/>
+          </a:fontRef>
+        </p:style>
+        <p:txBody>
+          <a:bodyPr rtlCol="0" anchor="ctr"/>
+          <a:lstStyle/>
+          <a:p>
+            <a:pPr algn="ctr"/>
+            <a:endParaRPr lang="en-US" dirty="0"/>
+          </a:p>
+        </p:txBody>
+      </p:sp>
+      <p:sp>
+        <p:nvSpPr>
+          <p:cNvPr id="18" name="Rectangle 17">
+            <a:extLst>
+              <a:ext uri="{FF2B5EF4-FFF2-40B4-BE49-F238E27FC236}">
+                <a16:creationId xmlns:a16="http://schemas.microsoft.com/office/drawing/2014/main" id="{AF2F604E-43BE-4DC3-B983-E071523364F8}"/>
+              </a:ext>
+              <a:ext uri="{C183D7F6-B498-43B3-948B-1728B52AA6E4}">
+                <adec:decorative xmlns:adec="http://schemas.microsoft.com/office/drawing/2017/decorative" val="1"/>
+              </a:ext>
+            </a:extLst>
+          </p:cNvPr>
+          <p:cNvSpPr>
+            <a:spLocks noGrp="1" noRot="1" noChangeAspect="1" noMove="1" noResize="1" noEditPoints="1" noAdjustHandles="1" noChangeArrowheads="1" noChangeShapeType="1" noTextEdit="1"/>
+          </p:cNvSpPr>
+          <p:nvPr>
+            <p:extLst>
+              <p:ext uri="{386F3935-93C4-4BCD-93E2-E3B085C9AB24}">
+                <p16:designElem xmlns:p16="http://schemas.microsoft.com/office/powerpoint/2015/main" val="1"/>
+              </p:ext>
+            </p:extLst>
+          </p:nvPr>
+        </p:nvSpPr>
+        <p:spPr>
+          <a:xfrm rot="5400000">
+            <a:off x="759921" y="346791"/>
+            <a:ext cx="146304" cy="704088"/>
+          </a:xfrm>
+          <a:prstGeom prst="rect">
+            <a:avLst/>
+          </a:prstGeom>
+          <a:solidFill>
+            <a:schemeClr val="accent2"/>
+          </a:solidFill>
+          <a:ln>
+            <a:noFill/>
+          </a:ln>
+        </p:spPr>
+        <p:style>
+          <a:lnRef idx="2">
+            <a:schemeClr val="accent1">
+              <a:shade val="50000"/>
+            </a:schemeClr>
+          </a:lnRef>
+          <a:fillRef idx="1">
+            <a:schemeClr val="accent1"/>
+          </a:fillRef>
+          <a:effectRef idx="0">
+            <a:schemeClr val="accent1"/>
+          </a:effectRef>
+          <a:fontRef idx="minor">
+            <a:schemeClr val="lt1"/>
+          </a:fontRef>
+        </p:style>
+        <p:txBody>
+          <a:bodyPr rtlCol="0" anchor="ctr"/>
+          <a:lstStyle/>
+          <a:p>
+            <a:pPr algn="ctr"/>
+            <a:endParaRPr lang="en-US">
+              <a:solidFill>
+                <a:prstClr val="white"/>
+              </a:solidFill>
+              <a:latin typeface="Calibri" panose="020F0502020204030204"/>
+            </a:endParaRPr>
+          </a:p>
+        </p:txBody>
+      </p:sp>
+      <p:sp>
+        <p:nvSpPr>
+          <p:cNvPr id="20" name="Rectangle 19">
+            <a:extLst>
+              <a:ext uri="{FF2B5EF4-FFF2-40B4-BE49-F238E27FC236}">
+                <a16:creationId xmlns:a16="http://schemas.microsoft.com/office/drawing/2014/main" id="{08C9B587-E65E-4B52-B37C-ABEBB6E87928}"/>
+              </a:ext>
+              <a:ext uri="{C183D7F6-B498-43B3-948B-1728B52AA6E4}">
+                <adec:decorative xmlns:adec="http://schemas.microsoft.com/office/drawing/2017/decorative" val="1"/>
+              </a:ext>
+            </a:extLst>
+          </p:cNvPr>
+          <p:cNvSpPr>
+            <a:spLocks noGrp="1" noRot="1" noChangeAspect="1" noMove="1" noResize="1" noEditPoints="1" noAdjustHandles="1" noChangeArrowheads="1" noChangeShapeType="1" noTextEdit="1"/>
+          </p:cNvSpPr>
+          <p:nvPr>
+            <p:extLst>
+              <p:ext uri="{386F3935-93C4-4BCD-93E2-E3B085C9AB24}">
+                <p16:designElem xmlns:p16="http://schemas.microsoft.com/office/powerpoint/2015/main" val="1"/>
+              </p:ext>
+            </p:extLst>
+          </p:nvPr>
+        </p:nvSpPr>
+        <p:spPr>
+          <a:xfrm>
+            <a:off x="481029" y="4546920"/>
+            <a:ext cx="3977640" cy="18288"/>
+          </a:xfrm>
+          <a:prstGeom prst="rect">
+            <a:avLst/>
+          </a:prstGeom>
+          <a:solidFill>
+            <a:schemeClr val="tx1"/>
+          </a:solidFill>
+          <a:ln w="3175">
+            <a:noFill/>
+          </a:ln>
+          <a:effectLst/>
+        </p:spPr>
+        <p:style>
+          <a:lnRef idx="2">
+            <a:schemeClr val="accent1">
+              <a:shade val="50000"/>
+            </a:schemeClr>
+          </a:lnRef>
+          <a:fillRef idx="1">
+            <a:schemeClr val="accent1"/>
+          </a:fillRef>
+          <a:effectRef idx="0">
+            <a:schemeClr val="accent1"/>
+          </a:effectRef>
+          <a:fontRef idx="minor">
+            <a:schemeClr val="lt1"/>
+          </a:fontRef>
+        </p:style>
+        <p:txBody>
+          <a:bodyPr rtlCol="0" anchor="ctr"/>
+          <a:lstStyle/>
+          <a:p>
+            <a:pPr marL="0" marR="0" lvl="0" indent="0" algn="ctr" defTabSz="914400" rtl="0" eaLnBrk="1" fontAlgn="auto" latinLnBrk="0" hangingPunct="1">
+              <a:lnSpc>
+                <a:spcPct val="100000"/>
+              </a:lnSpc>
+              <a:spcBef>
+                <a:spcPts val="0"/>
+              </a:spcBef>
+              <a:spcAft>
+                <a:spcPts val="0"/>
+              </a:spcAft>
+              <a:buClrTx/>
+              <a:buSzTx/>
+              <a:buFontTx/>
+              <a:buNone/>
+              <a:tabLst/>
+              <a:defRPr/>
+            </a:pPr>
+            <a:endParaRPr kumimoji="0" lang="en-US" sz="1800" b="0" i="0" u="none" strike="noStrike" kern="1200" cap="none" spc="0" normalizeH="0" baseline="0" noProof="0">
+              <a:ln>
+                <a:noFill/>
+              </a:ln>
+              <a:solidFill>
+                <a:prstClr val="white"/>
+              </a:solidFill>
+              <a:effectLst/>
+              <a:uLnTx/>
+              <a:uFillTx/>
+              <a:latin typeface="Calibri" panose="020F0502020204030204"/>
+              <a:ea typeface="+mn-ea"/>
+              <a:cs typeface="+mn-cs"/>
+            </a:endParaRPr>
+          </a:p>
+        </p:txBody>
+      </p:sp>
+      <p:sp>
+        <p:nvSpPr>
+          <p:cNvPr id="6" name="Rectangle 1">
+            <a:extLst>
+              <a:ext uri="{FF2B5EF4-FFF2-40B4-BE49-F238E27FC236}">
+                <a16:creationId xmlns:a16="http://schemas.microsoft.com/office/drawing/2014/main" id="{510F9FC8-E3E0-4916-7E1A-FA4DDBD00DE7}"/>
+              </a:ext>
+            </a:extLst>
+          </p:cNvPr>
+          <p:cNvSpPr>
+            <a:spLocks noChangeArrowheads="1"/>
+          </p:cNvSpPr>
+          <p:nvPr/>
+        </p:nvSpPr>
+        <p:spPr bwMode="auto">
+          <a:xfrm>
+            <a:off x="0" y="0"/>
+            <a:ext cx="12192000" cy="0"/>
+          </a:xfrm>
+          <a:prstGeom prst="rect">
+            <a:avLst/>
+          </a:prstGeom>
+          <a:noFill/>
+          <a:ln>
+            <a:noFill/>
+          </a:ln>
+          <a:effectLst/>
+          <a:extLst>
+            <a:ext uri="{909E8E84-426E-40DD-AFC4-6F175D3DCCD1}">
+              <a14:hiddenFill xmlns:a14="http://schemas.microsoft.com/office/drawing/2010/main">
+                <a:solidFill>
+                  <a:schemeClr val="accent1"/>
+                </a:solidFill>
+              </a14:hiddenFill>
+            </a:ext>
+            <a:ext uri="{91240B29-F687-4F45-9708-019B960494DF}">
+              <a14:hiddenLine xmlns:a14="http://schemas.microsoft.com/office/drawing/2010/main" w="9525">
+                <a:solidFill>
+                  <a:schemeClr val="tx1"/>
+                </a:solidFill>
+                <a:miter lim="800000"/>
+                <a:headEnd/>
+                <a:tailEnd/>
+              </a14:hiddenLine>
+            </a:ext>
+            <a:ext uri="{AF507438-7753-43E0-B8FC-AC1667EBCBE1}">
+              <a14:hiddenEffects xmlns:a14="http://schemas.microsoft.com/office/drawing/2010/main">
+                <a:effectLst>
+                  <a:outerShdw dist="35921" dir="2700000" algn="ctr" rotWithShape="0">
+                    <a:schemeClr val="bg2"/>
+                  </a:outerShdw>
+                </a:effectLst>
+              </a14:hiddenEffects>
+            </a:ext>
+          </a:extLst>
+        </p:spPr>
+        <p:txBody>
+          <a:bodyPr vert="horz" wrap="none" lIns="91440" tIns="45720" rIns="91440" bIns="45720" numCol="1" anchor="ctr" anchorCtr="0" compatLnSpc="1">
+            <a:prstTxWarp prst="textNoShape">
+              <a:avLst/>
+            </a:prstTxWarp>
+            <a:spAutoFit/>
+          </a:bodyPr>
+          <a:lstStyle/>
+          <a:p>
+            <a:endParaRPr lang="pt-BR"/>
+          </a:p>
+        </p:txBody>
+      </p:sp>
+      <p:sp>
+        <p:nvSpPr>
+          <p:cNvPr id="2" name="Título 1">
+            <a:extLst>
+              <a:ext uri="{FF2B5EF4-FFF2-40B4-BE49-F238E27FC236}">
+                <a16:creationId xmlns:a16="http://schemas.microsoft.com/office/drawing/2014/main" id="{BF51CFD8-D552-A71D-BE12-450E14F80B68}"/>
+              </a:ext>
+            </a:extLst>
+          </p:cNvPr>
+          <p:cNvSpPr>
+            <a:spLocks noGrp="1"/>
+          </p:cNvSpPr>
+          <p:nvPr>
+            <p:ph type="ctrTitle"/>
+          </p:nvPr>
+        </p:nvSpPr>
+        <p:spPr>
+          <a:xfrm>
+            <a:off x="5288674" y="2893329"/>
+            <a:ext cx="1614652" cy="777500"/>
+          </a:xfrm>
+        </p:spPr>
+        <p:txBody>
+          <a:bodyPr anchor="b">
+            <a:noAutofit/>
+          </a:bodyPr>
+          <a:lstStyle/>
+          <a:p>
+            <a:pPr algn="l"/>
+            <a:r>
+              <a:rPr lang="pt-BR" sz="4400" dirty="0">
+                <a:solidFill>
+                  <a:schemeClr val="bg1"/>
+                </a:solidFill>
+                <a:latin typeface="Varela"/>
+              </a:rPr>
+              <a:t>VISITA</a:t>
+            </a:r>
+          </a:p>
+        </p:txBody>
+      </p:sp>
+    </p:spTree>
+    <p:extLst>
+      <p:ext uri="{BB962C8B-B14F-4D97-AF65-F5344CB8AC3E}">
+        <p14:creationId xmlns:p14="http://schemas.microsoft.com/office/powerpoint/2010/main" val="230846951"/>
+      </p:ext>
+    </p:extLst>
+  </p:cSld>
+  <p:clrMapOvr>
+    <a:masterClrMapping/>
+  </p:clrMapOvr>
+  <p:transition spd="slow">
+    <p:wipe/>
+  </p:transition>
+</p:sld>
+</file>
+
+<file path=ppt/slides/slide4.xml><?xml version="1.0" encoding="utf-8"?>
+<p:sld xmlns:a="http://schemas.openxmlformats.org/drawingml/2006/main" xmlns:r="http://schemas.openxmlformats.org/officeDocument/2006/relationships" xmlns:p="http://schemas.openxmlformats.org/presentationml/2006/main">
+  <p:cSld>
+    <p:bg>
+      <p:bgPr>
+        <a:solidFill>
+          <a:srgbClr val="EDF2F4"/>
+        </a:solidFill>
+        <a:effectLst/>
+      </p:bgPr>
+    </p:bg>
+    <p:spTree>
+      <p:nvGrpSpPr>
+        <p:cNvPr id="1" name=""/>
+        <p:cNvGrpSpPr/>
+        <p:nvPr/>
+      </p:nvGrpSpPr>
+      <p:grpSpPr>
+        <a:xfrm>
+          <a:off x="0" y="0"/>
+          <a:ext cx="0" cy="0"/>
+          <a:chOff x="0" y="0"/>
+          <a:chExt cx="0" cy="0"/>
+        </a:xfrm>
+      </p:grpSpPr>
       <p:sp>
         <p:nvSpPr>
           <p:cNvPr id="2" name="Título 1">
@@ -4806,38 +6289,10 @@
             <p:ph type="title"/>
           </p:nvPr>
         </p:nvSpPr>
-        <p:spPr/>
-        <p:txBody>
-          <a:bodyPr/>
-          <a:lstStyle/>
-          <a:p>
-            <a:r>
-              <a:rPr lang="pt-BR" dirty="0"/>
-              <a:t>Metodologia e Organização</a:t>
-            </a:r>
-          </a:p>
-        </p:txBody>
-      </p:sp>
-      <p:sp>
-        <p:nvSpPr>
-          <p:cNvPr id="3" name="Espaço Reservado para Conteúdo 2">
-            <a:extLst>
-              <a:ext uri="{FF2B5EF4-FFF2-40B4-BE49-F238E27FC236}">
-                <a16:creationId xmlns:a16="http://schemas.microsoft.com/office/drawing/2014/main" id="{5161CDC8-FF07-0AD5-6381-DD5D23BA23D4}"/>
-              </a:ext>
-            </a:extLst>
-          </p:cNvPr>
-          <p:cNvSpPr>
-            <a:spLocks noGrp="1"/>
-          </p:cNvSpPr>
-          <p:nvPr>
-            <p:ph idx="1"/>
-          </p:nvPr>
-        </p:nvSpPr>
         <p:spPr>
           <a:xfrm>
-            <a:off x="1001593" y="1605782"/>
-            <a:ext cx="3350051" cy="4887093"/>
+            <a:off x="302113" y="261693"/>
+            <a:ext cx="10781838" cy="860649"/>
           </a:xfrm>
         </p:spPr>
         <p:txBody>
@@ -4846,42 +6301,125 @@
           </a:bodyPr>
           <a:lstStyle/>
           <a:p>
+            <a:r>
+              <a:rPr lang="pt-BR" sz="3600" dirty="0">
+                <a:solidFill>
+                  <a:srgbClr val="22223B"/>
+                </a:solidFill>
+                <a:latin typeface="Verdana" panose="020B0604030504040204" pitchFamily="34" charset="0"/>
+                <a:ea typeface="Verdana" panose="020B0604030504040204" pitchFamily="34" charset="0"/>
+              </a:rPr>
+              <a:t>Metodologia e Organização</a:t>
+            </a:r>
+          </a:p>
+        </p:txBody>
+      </p:sp>
+      <p:sp>
+        <p:nvSpPr>
+          <p:cNvPr id="3" name="Espaço Reservado para Conteúdo 2">
+            <a:extLst>
+              <a:ext uri="{FF2B5EF4-FFF2-40B4-BE49-F238E27FC236}">
+                <a16:creationId xmlns:a16="http://schemas.microsoft.com/office/drawing/2014/main" id="{5161CDC8-FF07-0AD5-6381-DD5D23BA23D4}"/>
+              </a:ext>
+            </a:extLst>
+          </p:cNvPr>
+          <p:cNvSpPr>
+            <a:spLocks noGrp="1"/>
+          </p:cNvSpPr>
+          <p:nvPr>
+            <p:ph idx="1"/>
+          </p:nvPr>
+        </p:nvSpPr>
+        <p:spPr>
+          <a:xfrm>
+            <a:off x="1170205" y="1930322"/>
+            <a:ext cx="3350051" cy="2318833"/>
+          </a:xfrm>
+        </p:spPr>
+        <p:txBody>
+          <a:bodyPr>
+            <a:normAutofit/>
+          </a:bodyPr>
+          <a:lstStyle/>
+          <a:p>
             <a:pPr marL="0" indent="0">
               <a:buNone/>
             </a:pPr>
             <a:r>
-              <a:rPr lang="pt-BR" sz="6000" dirty="0"/>
+              <a:rPr lang="pt-BR" sz="3500" dirty="0">
+                <a:solidFill>
+                  <a:srgbClr val="22223B"/>
+                </a:solidFill>
+                <a:latin typeface="Verdana" panose="020B0604030504040204" pitchFamily="34" charset="0"/>
+                <a:ea typeface="Verdana" panose="020B0604030504040204" pitchFamily="34" charset="0"/>
+              </a:rPr>
               <a:t>SCRUM:</a:t>
             </a:r>
           </a:p>
           <a:p>
             <a:r>
-              <a:rPr lang="pt-BR" sz="2000" dirty="0"/>
+              <a:rPr lang="pt-BR" sz="1600" dirty="0">
+                <a:solidFill>
+                  <a:srgbClr val="22223B"/>
+                </a:solidFill>
+                <a:latin typeface="Verdana" panose="020B0604030504040204" pitchFamily="34" charset="0"/>
+                <a:ea typeface="Verdana" panose="020B0604030504040204" pitchFamily="34" charset="0"/>
+              </a:rPr>
               <a:t>Daily</a:t>
             </a:r>
           </a:p>
           <a:p>
             <a:r>
-              <a:rPr lang="pt-BR" sz="2000" dirty="0"/>
+              <a:rPr lang="pt-BR" sz="1600" dirty="0">
+                <a:solidFill>
+                  <a:srgbClr val="22223B"/>
+                </a:solidFill>
+                <a:latin typeface="Verdana" panose="020B0604030504040204" pitchFamily="34" charset="0"/>
+                <a:ea typeface="Verdana" panose="020B0604030504040204" pitchFamily="34" charset="0"/>
+              </a:rPr>
               <a:t>Sprints</a:t>
             </a:r>
           </a:p>
           <a:p>
             <a:r>
-              <a:rPr lang="pt-BR" sz="2000" dirty="0"/>
+              <a:rPr lang="pt-BR" sz="1600" dirty="0">
+                <a:solidFill>
+                  <a:srgbClr val="22223B"/>
+                </a:solidFill>
+                <a:latin typeface="Verdana" panose="020B0604030504040204" pitchFamily="34" charset="0"/>
+                <a:ea typeface="Verdana" panose="020B0604030504040204" pitchFamily="34" charset="0"/>
+              </a:rPr>
               <a:t>Sprint Planning</a:t>
             </a:r>
           </a:p>
           <a:p>
             <a:r>
-              <a:rPr lang="pt-BR" sz="2000" dirty="0"/>
+              <a:rPr lang="pt-BR" sz="1600" dirty="0">
+                <a:solidFill>
+                  <a:srgbClr val="22223B"/>
+                </a:solidFill>
+                <a:latin typeface="Verdana" panose="020B0604030504040204" pitchFamily="34" charset="0"/>
+                <a:ea typeface="Verdana" panose="020B0604030504040204" pitchFamily="34" charset="0"/>
+              </a:rPr>
               <a:t>Sprint </a:t>
             </a:r>
             <a:r>
-              <a:rPr lang="pt-BR" sz="2000" dirty="0" err="1"/>
+              <a:rPr lang="pt-BR" sz="1600" dirty="0" err="1">
+                <a:solidFill>
+                  <a:srgbClr val="22223B"/>
+                </a:solidFill>
+                <a:latin typeface="Verdana" panose="020B0604030504040204" pitchFamily="34" charset="0"/>
+                <a:ea typeface="Verdana" panose="020B0604030504040204" pitchFamily="34" charset="0"/>
+              </a:rPr>
               <a:t>Retrospective</a:t>
             </a:r>
-            <a:endParaRPr lang="pt-BR" sz="2000" dirty="0"/>
+            <a:endParaRPr lang="pt-BR" sz="1600" dirty="0">
+              <a:solidFill>
+                <a:srgbClr val="22223B"/>
+              </a:solidFill>
+              <a:latin typeface="Verdana" panose="020B0604030504040204" pitchFamily="34" charset="0"/>
+              <a:ea typeface="Verdana" panose="020B0604030504040204" pitchFamily="34" charset="0"/>
+            </a:endParaRPr>
           </a:p>
           <a:p>
             <a:endParaRPr lang="pt-BR" sz="1800" dirty="0"/>
@@ -4894,12 +6432,118 @@
           </a:p>
         </p:txBody>
       </p:sp>
+      <p:grpSp>
+        <p:nvGrpSpPr>
+          <p:cNvPr id="5" name="Agrupar 4">
+            <a:extLst>
+              <a:ext uri="{FF2B5EF4-FFF2-40B4-BE49-F238E27FC236}">
+                <a16:creationId xmlns:a16="http://schemas.microsoft.com/office/drawing/2014/main" id="{E5B1075F-FBE6-707B-4B87-408F2FC21B93}"/>
+              </a:ext>
+            </a:extLst>
+          </p:cNvPr>
+          <p:cNvGrpSpPr/>
+          <p:nvPr/>
+        </p:nvGrpSpPr>
+        <p:grpSpPr>
+          <a:xfrm>
+            <a:off x="8150828" y="1610009"/>
+            <a:ext cx="2589806" cy="939275"/>
+            <a:chOff x="8140184" y="1713115"/>
+            <a:chExt cx="2589806" cy="939275"/>
+          </a:xfrm>
+        </p:grpSpPr>
+        <p:pic>
+          <p:nvPicPr>
+            <p:cNvPr id="1026" name="Picture 2">
+              <a:extLst>
+                <a:ext uri="{FF2B5EF4-FFF2-40B4-BE49-F238E27FC236}">
+                  <a16:creationId xmlns:a16="http://schemas.microsoft.com/office/drawing/2014/main" id="{A4B7FC50-3CF9-2392-5CED-4A22B3985719}"/>
+                </a:ext>
+              </a:extLst>
+            </p:cNvPr>
+            <p:cNvPicPr>
+              <a:picLocks noChangeAspect="1" noChangeArrowheads="1"/>
+            </p:cNvPicPr>
+            <p:nvPr/>
+          </p:nvPicPr>
+          <p:blipFill>
+            <a:blip r:embed="rId2">
+              <a:extLst>
+                <a:ext uri="{28A0092B-C50C-407E-A947-70E740481C1C}">
+                  <a14:useLocalDpi xmlns:a14="http://schemas.microsoft.com/office/drawing/2010/main" val="0"/>
+                </a:ext>
+              </a:extLst>
+            </a:blip>
+            <a:srcRect/>
+            <a:stretch>
+              <a:fillRect/>
+            </a:stretch>
+          </p:blipFill>
+          <p:spPr bwMode="auto">
+            <a:xfrm>
+              <a:off x="8140184" y="1713115"/>
+              <a:ext cx="939275" cy="939275"/>
+            </a:xfrm>
+            <a:prstGeom prst="rect">
+              <a:avLst/>
+            </a:prstGeom>
+            <a:noFill/>
+            <a:extLst>
+              <a:ext uri="{909E8E84-426E-40DD-AFC4-6F175D3DCCD1}">
+                <a14:hiddenFill xmlns:a14="http://schemas.microsoft.com/office/drawing/2010/main">
+                  <a:solidFill>
+                    <a:srgbClr val="FFFFFF"/>
+                  </a:solidFill>
+                </a14:hiddenFill>
+              </a:ext>
+            </a:extLst>
+          </p:spPr>
+        </p:pic>
+        <p:sp>
+          <p:nvSpPr>
+            <p:cNvPr id="4" name="CaixaDeTexto 3">
+              <a:extLst>
+                <a:ext uri="{FF2B5EF4-FFF2-40B4-BE49-F238E27FC236}">
+                  <a16:creationId xmlns:a16="http://schemas.microsoft.com/office/drawing/2014/main" id="{69653506-C7EF-3417-0623-767B75632118}"/>
+                </a:ext>
+              </a:extLst>
+            </p:cNvPr>
+            <p:cNvSpPr txBox="1"/>
+            <p:nvPr/>
+          </p:nvSpPr>
+          <p:spPr>
+            <a:xfrm>
+              <a:off x="8942856" y="1936116"/>
+              <a:ext cx="1787134" cy="630942"/>
+            </a:xfrm>
+            <a:prstGeom prst="rect">
+              <a:avLst/>
+            </a:prstGeom>
+            <a:noFill/>
+          </p:spPr>
+          <p:txBody>
+            <a:bodyPr wrap="square" rtlCol="0">
+              <a:spAutoFit/>
+            </a:bodyPr>
+            <a:lstStyle/>
+            <a:p>
+              <a:r>
+                <a:rPr lang="pt-BR" sz="3500" dirty="0">
+                  <a:latin typeface="Verdana" panose="020B0604030504040204" pitchFamily="34" charset="0"/>
+                  <a:ea typeface="Verdana" panose="020B0604030504040204" pitchFamily="34" charset="0"/>
+                </a:rPr>
+                <a:t>GitHub</a:t>
+              </a:r>
+            </a:p>
+          </p:txBody>
+        </p:sp>
+      </p:grpSp>
       <p:pic>
         <p:nvPicPr>
-          <p:cNvPr id="1026" name="Picture 2">
-            <a:extLst>
-              <a:ext uri="{FF2B5EF4-FFF2-40B4-BE49-F238E27FC236}">
-                <a16:creationId xmlns:a16="http://schemas.microsoft.com/office/drawing/2014/main" id="{A4B7FC50-3CF9-2392-5CED-4A22B3985719}"/>
+          <p:cNvPr id="1028" name="Picture 4" descr="Pasta - ícones de arquivos e pastas grátis">
+            <a:extLst>
+              <a:ext uri="{FF2B5EF4-FFF2-40B4-BE49-F238E27FC236}">
+                <a16:creationId xmlns:a16="http://schemas.microsoft.com/office/drawing/2014/main" id="{B01FDC99-A2BA-A7F5-027F-D811DE509FC7}"/>
               </a:ext>
             </a:extLst>
           </p:cNvPr>
@@ -4909,7 +6553,7 @@
           <p:nvPr/>
         </p:nvPicPr>
         <p:blipFill>
-          <a:blip r:embed="rId2">
+          <a:blip r:embed="rId3">
             <a:extLst>
               <a:ext uri="{28A0092B-C50C-407E-A947-70E740481C1C}">
                 <a14:useLocalDpi xmlns:a14="http://schemas.microsoft.com/office/drawing/2010/main" val="0"/>
@@ -4923,8 +6567,8 @@
         </p:blipFill>
         <p:spPr bwMode="auto">
           <a:xfrm>
-            <a:off x="7389059" y="1312312"/>
-            <a:ext cx="1182963" cy="1182963"/>
+            <a:off x="8150828" y="3217341"/>
+            <a:ext cx="537030" cy="515723"/>
           </a:xfrm>
           <a:prstGeom prst="rect">
             <a:avLst/>
@@ -4943,10 +6587,10 @@
       </p:pic>
       <p:sp>
         <p:nvSpPr>
-          <p:cNvPr id="4" name="CaixaDeTexto 3">
-            <a:extLst>
-              <a:ext uri="{FF2B5EF4-FFF2-40B4-BE49-F238E27FC236}">
-                <a16:creationId xmlns:a16="http://schemas.microsoft.com/office/drawing/2014/main" id="{69653506-C7EF-3417-0623-767B75632118}"/>
+          <p:cNvPr id="8" name="CaixaDeTexto 7">
+            <a:extLst>
+              <a:ext uri="{FF2B5EF4-FFF2-40B4-BE49-F238E27FC236}">
+                <a16:creationId xmlns:a16="http://schemas.microsoft.com/office/drawing/2014/main" id="{C3369C1D-136B-54E8-3981-7C2EDC2AFA7F}"/>
               </a:ext>
             </a:extLst>
           </p:cNvPr>
@@ -4955,8 +6599,8 @@
         </p:nvSpPr>
         <p:spPr>
           <a:xfrm>
-            <a:off x="8546569" y="1401063"/>
-            <a:ext cx="3062868" cy="1015663"/>
+            <a:off x="8711381" y="3198167"/>
+            <a:ext cx="2937415" cy="461665"/>
           </a:xfrm>
           <a:prstGeom prst="rect">
             <a:avLst/>
@@ -4970,19 +6614,31 @@
           <a:lstStyle/>
           <a:p>
             <a:r>
-              <a:rPr lang="pt-BR" sz="6000" dirty="0"/>
-              <a:t>GitHub</a:t>
-            </a:r>
-            <a:endParaRPr lang="pt-BR" sz="4400" dirty="0"/>
+              <a:rPr lang="pt-BR" sz="2400" dirty="0" err="1">
+                <a:solidFill>
+                  <a:srgbClr val="22223B"/>
+                </a:solidFill>
+                <a:latin typeface="Verdana" panose="020B0604030504040204" pitchFamily="34" charset="0"/>
+                <a:ea typeface="Verdana" panose="020B0604030504040204" pitchFamily="34" charset="0"/>
+              </a:rPr>
+              <a:t>Banco_de_Dados</a:t>
+            </a:r>
+            <a:endParaRPr lang="pt-BR" dirty="0">
+              <a:solidFill>
+                <a:srgbClr val="22223B"/>
+              </a:solidFill>
+              <a:latin typeface="Verdana" panose="020B0604030504040204" pitchFamily="34" charset="0"/>
+              <a:ea typeface="Verdana" panose="020B0604030504040204" pitchFamily="34" charset="0"/>
+            </a:endParaRPr>
           </a:p>
         </p:txBody>
       </p:sp>
       <p:pic>
         <p:nvPicPr>
-          <p:cNvPr id="1028" name="Picture 4" descr="Pasta - ícones de arquivos e pastas grátis">
-            <a:extLst>
-              <a:ext uri="{FF2B5EF4-FFF2-40B4-BE49-F238E27FC236}">
-                <a16:creationId xmlns:a16="http://schemas.microsoft.com/office/drawing/2014/main" id="{B01FDC99-A2BA-A7F5-027F-D811DE509FC7}"/>
+          <p:cNvPr id="10" name="Picture 4" descr="Pasta - ícones de arquivos e pastas grátis">
+            <a:extLst>
+              <a:ext uri="{FF2B5EF4-FFF2-40B4-BE49-F238E27FC236}">
+                <a16:creationId xmlns:a16="http://schemas.microsoft.com/office/drawing/2014/main" id="{38166DD5-B561-E941-B9DF-B7A5CFF0422C}"/>
               </a:ext>
             </a:extLst>
           </p:cNvPr>
@@ -5006,8 +6662,8 @@
         </p:blipFill>
         <p:spPr bwMode="auto">
           <a:xfrm>
-            <a:off x="7846029" y="2661894"/>
-            <a:ext cx="442565" cy="442565"/>
+            <a:off x="8150828" y="4018888"/>
+            <a:ext cx="537030" cy="515723"/>
           </a:xfrm>
           <a:prstGeom prst="rect">
             <a:avLst/>
@@ -5026,10 +6682,10 @@
       </p:pic>
       <p:sp>
         <p:nvSpPr>
-          <p:cNvPr id="8" name="CaixaDeTexto 7">
-            <a:extLst>
-              <a:ext uri="{FF2B5EF4-FFF2-40B4-BE49-F238E27FC236}">
-                <a16:creationId xmlns:a16="http://schemas.microsoft.com/office/drawing/2014/main" id="{C3369C1D-136B-54E8-3981-7C2EDC2AFA7F}"/>
+          <p:cNvPr id="11" name="CaixaDeTexto 10">
+            <a:extLst>
+              <a:ext uri="{FF2B5EF4-FFF2-40B4-BE49-F238E27FC236}">
+                <a16:creationId xmlns:a16="http://schemas.microsoft.com/office/drawing/2014/main" id="{F1FD733B-1603-551D-9FC5-27D724BC858D}"/>
               </a:ext>
             </a:extLst>
           </p:cNvPr>
@@ -5038,8 +6694,8 @@
         </p:nvSpPr>
         <p:spPr>
           <a:xfrm>
-            <a:off x="8406582" y="2661329"/>
-            <a:ext cx="2519921" cy="461665"/>
+            <a:off x="8711382" y="4018323"/>
+            <a:ext cx="2176316" cy="461665"/>
           </a:xfrm>
           <a:prstGeom prst="rect">
             <a:avLst/>
@@ -5047,25 +6703,37 @@
           <a:noFill/>
         </p:spPr>
         <p:txBody>
-          <a:bodyPr wrap="none" rtlCol="0">
+          <a:bodyPr wrap="square" rtlCol="0">
             <a:spAutoFit/>
           </a:bodyPr>
           <a:lstStyle/>
           <a:p>
             <a:r>
-              <a:rPr lang="pt-BR" sz="2400" dirty="0" err="1"/>
-              <a:t>Banco_de_Dados</a:t>
-            </a:r>
-            <a:endParaRPr lang="pt-BR" dirty="0"/>
+              <a:rPr lang="pt-BR" sz="2400" dirty="0">
+                <a:solidFill>
+                  <a:srgbClr val="22223B"/>
+                </a:solidFill>
+                <a:latin typeface="Verdana" panose="020B0604030504040204" pitchFamily="34" charset="0"/>
+                <a:ea typeface="Verdana" panose="020B0604030504040204" pitchFamily="34" charset="0"/>
+              </a:rPr>
+              <a:t>Documentos</a:t>
+            </a:r>
+            <a:endParaRPr lang="pt-BR" dirty="0">
+              <a:solidFill>
+                <a:srgbClr val="22223B"/>
+              </a:solidFill>
+              <a:latin typeface="Verdana" panose="020B0604030504040204" pitchFamily="34" charset="0"/>
+              <a:ea typeface="Verdana" panose="020B0604030504040204" pitchFamily="34" charset="0"/>
+            </a:endParaRPr>
           </a:p>
         </p:txBody>
       </p:sp>
       <p:pic>
         <p:nvPicPr>
-          <p:cNvPr id="10" name="Picture 4" descr="Pasta - ícones de arquivos e pastas grátis">
-            <a:extLst>
-              <a:ext uri="{FF2B5EF4-FFF2-40B4-BE49-F238E27FC236}">
-                <a16:creationId xmlns:a16="http://schemas.microsoft.com/office/drawing/2014/main" id="{38166DD5-B561-E941-B9DF-B7A5CFF0422C}"/>
+          <p:cNvPr id="12" name="Picture 4" descr="Pasta - ícones de arquivos e pastas grátis">
+            <a:extLst>
+              <a:ext uri="{FF2B5EF4-FFF2-40B4-BE49-F238E27FC236}">
+                <a16:creationId xmlns:a16="http://schemas.microsoft.com/office/drawing/2014/main" id="{7923D9CC-8864-F46E-68B5-1C96138C1508}"/>
               </a:ext>
             </a:extLst>
           </p:cNvPr>
@@ -5089,8 +6757,8 @@
         </p:blipFill>
         <p:spPr bwMode="auto">
           <a:xfrm>
-            <a:off x="7846029" y="3482050"/>
-            <a:ext cx="442565" cy="442565"/>
+            <a:off x="8156264" y="4831269"/>
+            <a:ext cx="537030" cy="515723"/>
           </a:xfrm>
           <a:prstGeom prst="rect">
             <a:avLst/>
@@ -5109,10 +6777,10 @@
       </p:pic>
       <p:sp>
         <p:nvSpPr>
-          <p:cNvPr id="11" name="CaixaDeTexto 10">
-            <a:extLst>
-              <a:ext uri="{FF2B5EF4-FFF2-40B4-BE49-F238E27FC236}">
-                <a16:creationId xmlns:a16="http://schemas.microsoft.com/office/drawing/2014/main" id="{F1FD733B-1603-551D-9FC5-27D724BC858D}"/>
+          <p:cNvPr id="13" name="CaixaDeTexto 12">
+            <a:extLst>
+              <a:ext uri="{FF2B5EF4-FFF2-40B4-BE49-F238E27FC236}">
+                <a16:creationId xmlns:a16="http://schemas.microsoft.com/office/drawing/2014/main" id="{167A2AA1-3F45-D352-67E0-D09C55F5E60F}"/>
               </a:ext>
             </a:extLst>
           </p:cNvPr>
@@ -5121,8 +6789,8 @@
         </p:nvSpPr>
         <p:spPr>
           <a:xfrm>
-            <a:off x="8406582" y="3481485"/>
-            <a:ext cx="1911229" cy="461665"/>
+            <a:off x="8716817" y="4812095"/>
+            <a:ext cx="2494953" cy="461665"/>
           </a:xfrm>
           <a:prstGeom prst="rect">
             <a:avLst/>
@@ -5130,25 +6798,37 @@
           <a:noFill/>
         </p:spPr>
         <p:txBody>
-          <a:bodyPr wrap="none" rtlCol="0">
+          <a:bodyPr wrap="square" rtlCol="0">
             <a:spAutoFit/>
           </a:bodyPr>
           <a:lstStyle/>
           <a:p>
             <a:r>
-              <a:rPr lang="pt-BR" sz="2400" dirty="0"/>
-              <a:t>Documentos</a:t>
-            </a:r>
-            <a:endParaRPr lang="pt-BR" dirty="0"/>
+              <a:rPr lang="pt-BR" sz="2400" dirty="0" err="1">
+                <a:solidFill>
+                  <a:srgbClr val="22223B"/>
+                </a:solidFill>
+                <a:latin typeface="Verdana" panose="020B0604030504040204" pitchFamily="34" charset="0"/>
+                <a:ea typeface="Verdana" panose="020B0604030504040204" pitchFamily="34" charset="0"/>
+              </a:rPr>
+              <a:t>Login_Netmed</a:t>
+            </a:r>
+            <a:endParaRPr lang="pt-BR" dirty="0">
+              <a:solidFill>
+                <a:srgbClr val="22223B"/>
+              </a:solidFill>
+              <a:latin typeface="Verdana" panose="020B0604030504040204" pitchFamily="34" charset="0"/>
+              <a:ea typeface="Verdana" panose="020B0604030504040204" pitchFamily="34" charset="0"/>
+            </a:endParaRPr>
           </a:p>
         </p:txBody>
       </p:sp>
       <p:pic>
         <p:nvPicPr>
-          <p:cNvPr id="12" name="Picture 4" descr="Pasta - ícones de arquivos e pastas grátis">
-            <a:extLst>
-              <a:ext uri="{FF2B5EF4-FFF2-40B4-BE49-F238E27FC236}">
-                <a16:creationId xmlns:a16="http://schemas.microsoft.com/office/drawing/2014/main" id="{7923D9CC-8864-F46E-68B5-1C96138C1508}"/>
+          <p:cNvPr id="14" name="Picture 4" descr="Pasta - ícones de arquivos e pastas grátis">
+            <a:extLst>
+              <a:ext uri="{FF2B5EF4-FFF2-40B4-BE49-F238E27FC236}">
+                <a16:creationId xmlns:a16="http://schemas.microsoft.com/office/drawing/2014/main" id="{E9F3F5D2-3972-8075-51D6-085620EFBB7D}"/>
               </a:ext>
             </a:extLst>
           </p:cNvPr>
@@ -5172,8 +6852,8 @@
         </p:blipFill>
         <p:spPr bwMode="auto">
           <a:xfrm>
-            <a:off x="7851465" y="4275822"/>
-            <a:ext cx="442565" cy="442565"/>
+            <a:off x="8156264" y="5670525"/>
+            <a:ext cx="537030" cy="515723"/>
           </a:xfrm>
           <a:prstGeom prst="rect">
             <a:avLst/>
@@ -5192,10 +6872,10 @@
       </p:pic>
       <p:sp>
         <p:nvSpPr>
-          <p:cNvPr id="13" name="CaixaDeTexto 12">
-            <a:extLst>
-              <a:ext uri="{FF2B5EF4-FFF2-40B4-BE49-F238E27FC236}">
-                <a16:creationId xmlns:a16="http://schemas.microsoft.com/office/drawing/2014/main" id="{167A2AA1-3F45-D352-67E0-D09C55F5E60F}"/>
+          <p:cNvPr id="15" name="CaixaDeTexto 14">
+            <a:extLst>
+              <a:ext uri="{FF2B5EF4-FFF2-40B4-BE49-F238E27FC236}">
+                <a16:creationId xmlns:a16="http://schemas.microsoft.com/office/drawing/2014/main" id="{7AE60127-37B0-DBA1-1337-4D79A0CD6557}"/>
               </a:ext>
             </a:extLst>
           </p:cNvPr>
@@ -5204,8 +6884,8 @@
         </p:nvSpPr>
         <p:spPr>
           <a:xfrm>
-            <a:off x="8412018" y="4275257"/>
-            <a:ext cx="2120260" cy="461665"/>
+            <a:off x="8716818" y="5651351"/>
+            <a:ext cx="2973736" cy="461665"/>
           </a:xfrm>
           <a:prstGeom prst="rect">
             <a:avLst/>
@@ -5213,72 +6893,37 @@
           <a:noFill/>
         </p:spPr>
         <p:txBody>
-          <a:bodyPr wrap="none" rtlCol="0">
+          <a:bodyPr wrap="square" rtlCol="0">
             <a:spAutoFit/>
           </a:bodyPr>
           <a:lstStyle/>
           <a:p>
             <a:r>
-              <a:rPr lang="pt-BR" sz="2400" dirty="0" err="1"/>
-              <a:t>Login_Netmed</a:t>
-            </a:r>
-            <a:endParaRPr lang="pt-BR" dirty="0"/>
-          </a:p>
-        </p:txBody>
-      </p:sp>
-      <p:pic>
-        <p:nvPicPr>
-          <p:cNvPr id="14" name="Picture 4" descr="Pasta - ícones de arquivos e pastas grátis">
-            <a:extLst>
-              <a:ext uri="{FF2B5EF4-FFF2-40B4-BE49-F238E27FC236}">
-                <a16:creationId xmlns:a16="http://schemas.microsoft.com/office/drawing/2014/main" id="{E9F3F5D2-3972-8075-51D6-085620EFBB7D}"/>
-              </a:ext>
-            </a:extLst>
-          </p:cNvPr>
-          <p:cNvPicPr>
-            <a:picLocks noChangeAspect="1" noChangeArrowheads="1"/>
-          </p:cNvPicPr>
-          <p:nvPr/>
-        </p:nvPicPr>
-        <p:blipFill>
-          <a:blip r:embed="rId3">
-            <a:extLst>
-              <a:ext uri="{28A0092B-C50C-407E-A947-70E740481C1C}">
-                <a14:useLocalDpi xmlns:a14="http://schemas.microsoft.com/office/drawing/2010/main" val="0"/>
-              </a:ext>
-            </a:extLst>
-          </a:blip>
-          <a:srcRect/>
-          <a:stretch>
-            <a:fillRect/>
-          </a:stretch>
-        </p:blipFill>
-        <p:spPr bwMode="auto">
-          <a:xfrm>
-            <a:off x="7851465" y="5115078"/>
-            <a:ext cx="442565" cy="442565"/>
-          </a:xfrm>
-          <a:prstGeom prst="rect">
-            <a:avLst/>
-          </a:prstGeom>
-          <a:noFill/>
-          <a:extLst>
-            <a:ext uri="{909E8E84-426E-40DD-AFC4-6F175D3DCCD1}">
-              <a14:hiddenFill xmlns:a14="http://schemas.microsoft.com/office/drawing/2010/main">
+              <a:rPr lang="pt-BR" sz="2400" u="sng" dirty="0" err="1">
                 <a:solidFill>
-                  <a:srgbClr val="FFFFFF"/>
+                  <a:srgbClr val="22223B"/>
                 </a:solidFill>
-              </a14:hiddenFill>
-            </a:ext>
-          </a:extLst>
-        </p:spPr>
-      </p:pic>
-      <p:sp>
-        <p:nvSpPr>
-          <p:cNvPr id="15" name="CaixaDeTexto 14">
-            <a:extLst>
-              <a:ext uri="{FF2B5EF4-FFF2-40B4-BE49-F238E27FC236}">
-                <a16:creationId xmlns:a16="http://schemas.microsoft.com/office/drawing/2014/main" id="{7AE60127-37B0-DBA1-1337-4D79A0CD6557}"/>
+                <a:latin typeface="Verdana" panose="020B0604030504040204" pitchFamily="34" charset="0"/>
+                <a:ea typeface="Verdana" panose="020B0604030504040204" pitchFamily="34" charset="0"/>
+              </a:rPr>
+              <a:t>Site_Institucional</a:t>
+            </a:r>
+            <a:endParaRPr lang="pt-BR" u="sng" dirty="0">
+              <a:solidFill>
+                <a:srgbClr val="22223B"/>
+              </a:solidFill>
+              <a:latin typeface="Verdana" panose="020B0604030504040204" pitchFamily="34" charset="0"/>
+              <a:ea typeface="Verdana" panose="020B0604030504040204" pitchFamily="34" charset="0"/>
+            </a:endParaRPr>
+          </a:p>
+        </p:txBody>
+      </p:sp>
+      <p:sp>
+        <p:nvSpPr>
+          <p:cNvPr id="16" name="CaixaDeTexto 15">
+            <a:extLst>
+              <a:ext uri="{FF2B5EF4-FFF2-40B4-BE49-F238E27FC236}">
+                <a16:creationId xmlns:a16="http://schemas.microsoft.com/office/drawing/2014/main" id="{6ACF3904-1EFF-12EA-8577-2DA04B669099}"/>
               </a:ext>
             </a:extLst>
           </p:cNvPr>
@@ -5287,8 +6932,8 @@
         </p:nvSpPr>
         <p:spPr>
           <a:xfrm>
-            <a:off x="8412018" y="5114513"/>
-            <a:ext cx="2494529" cy="461665"/>
+            <a:off x="5260531" y="1902260"/>
+            <a:ext cx="1409748" cy="1123384"/>
           </a:xfrm>
           <a:prstGeom prst="rect">
             <a:avLst/>
@@ -5296,87 +6941,1262 @@
           <a:noFill/>
         </p:spPr>
         <p:txBody>
-          <a:bodyPr wrap="none" rtlCol="0">
+          <a:bodyPr wrap="square" rtlCol="0">
             <a:spAutoFit/>
           </a:bodyPr>
           <a:lstStyle/>
           <a:p>
-            <a:r>
-              <a:rPr lang="pt-BR" sz="2400" u="sng" dirty="0" err="1"/>
-              <a:t>Site_Institucional</a:t>
-            </a:r>
-            <a:endParaRPr lang="pt-BR" u="sng" dirty="0"/>
-          </a:p>
-        </p:txBody>
-      </p:sp>
-      <p:sp>
-        <p:nvSpPr>
-          <p:cNvPr id="16" name="CaixaDeTexto 15">
-            <a:extLst>
-              <a:ext uri="{FF2B5EF4-FFF2-40B4-BE49-F238E27FC236}">
-                <a16:creationId xmlns:a16="http://schemas.microsoft.com/office/drawing/2014/main" id="{6ACF3904-1EFF-12EA-8577-2DA04B669099}"/>
-              </a:ext>
-            </a:extLst>
-          </p:cNvPr>
-          <p:cNvSpPr txBox="1"/>
-          <p:nvPr/>
+            <a:pPr marL="0" indent="0">
+              <a:buNone/>
+            </a:pPr>
+            <a:r>
+              <a:rPr lang="pt-BR" sz="3500" dirty="0">
+                <a:solidFill>
+                  <a:srgbClr val="22223B"/>
+                </a:solidFill>
+                <a:latin typeface="Verdana" panose="020B0604030504040204" pitchFamily="34" charset="0"/>
+                <a:ea typeface="Verdana" panose="020B0604030504040204" pitchFamily="34" charset="0"/>
+              </a:rPr>
+              <a:t>EOS:</a:t>
+            </a:r>
+          </a:p>
+          <a:p>
+            <a:pPr marL="342900" indent="-342900">
+              <a:buFont typeface="Arial" panose="020B0604020202020204" pitchFamily="34" charset="0"/>
+              <a:buChar char="•"/>
+            </a:pPr>
+            <a:r>
+              <a:rPr lang="pt-BR" sz="1600" dirty="0">
+                <a:solidFill>
+                  <a:srgbClr val="22223B"/>
+                </a:solidFill>
+                <a:latin typeface="Verdana" panose="020B0604030504040204" pitchFamily="34" charset="0"/>
+                <a:ea typeface="Verdana" panose="020B0604030504040204" pitchFamily="34" charset="0"/>
+              </a:rPr>
+              <a:t>L-10</a:t>
+            </a:r>
+          </a:p>
+          <a:p>
+            <a:pPr marL="342900" indent="-342900">
+              <a:buFont typeface="Arial" panose="020B0604020202020204" pitchFamily="34" charset="0"/>
+              <a:buChar char="•"/>
+            </a:pPr>
+            <a:r>
+              <a:rPr lang="pt-BR" sz="1600" dirty="0">
+                <a:solidFill>
+                  <a:srgbClr val="22223B"/>
+                </a:solidFill>
+                <a:latin typeface="Verdana" panose="020B0604030504040204" pitchFamily="34" charset="0"/>
+                <a:ea typeface="Verdana" panose="020B0604030504040204" pitchFamily="34" charset="0"/>
+              </a:rPr>
+              <a:t>IDS</a:t>
+            </a:r>
+          </a:p>
+        </p:txBody>
+      </p:sp>
+    </p:spTree>
+    <p:extLst>
+      <p:ext uri="{BB962C8B-B14F-4D97-AF65-F5344CB8AC3E}">
+        <p14:creationId xmlns:p14="http://schemas.microsoft.com/office/powerpoint/2010/main" val="3053839141"/>
+      </p:ext>
+    </p:extLst>
+  </p:cSld>
+  <p:clrMapOvr>
+    <a:masterClrMapping/>
+  </p:clrMapOvr>
+</p:sld>
+</file>
+
+<file path=ppt/slides/slide5.xml><?xml version="1.0" encoding="utf-8"?>
+<p:sld xmlns:a="http://schemas.openxmlformats.org/drawingml/2006/main" xmlns:r="http://schemas.openxmlformats.org/officeDocument/2006/relationships" xmlns:p="http://schemas.openxmlformats.org/presentationml/2006/main">
+  <p:cSld>
+    <p:bg>
+      <p:bgPr>
+        <a:solidFill>
+          <a:srgbClr val="EDF2F4"/>
+        </a:solidFill>
+        <a:effectLst/>
+      </p:bgPr>
+    </p:bg>
+    <p:spTree>
+      <p:nvGrpSpPr>
+        <p:cNvPr id="1" name=""/>
+        <p:cNvGrpSpPr/>
+        <p:nvPr/>
+      </p:nvGrpSpPr>
+      <p:grpSpPr>
+        <a:xfrm>
+          <a:off x="0" y="0"/>
+          <a:ext cx="0" cy="0"/>
+          <a:chOff x="0" y="0"/>
+          <a:chExt cx="0" cy="0"/>
+        </a:xfrm>
+      </p:grpSpPr>
+      <p:sp>
+        <p:nvSpPr>
+          <p:cNvPr id="2" name="Título 1">
+            <a:extLst>
+              <a:ext uri="{FF2B5EF4-FFF2-40B4-BE49-F238E27FC236}">
+                <a16:creationId xmlns:a16="http://schemas.microsoft.com/office/drawing/2014/main" id="{4513B46C-8276-1518-93A5-526E041946FC}"/>
+              </a:ext>
+            </a:extLst>
+          </p:cNvPr>
+          <p:cNvSpPr>
+            <a:spLocks noGrp="1"/>
+          </p:cNvSpPr>
+          <p:nvPr>
+            <p:ph type="title"/>
+          </p:nvPr>
         </p:nvSpPr>
         <p:spPr>
           <a:xfrm>
-            <a:off x="4686252" y="1557881"/>
-            <a:ext cx="1911229" cy="2154436"/>
+            <a:off x="302113" y="261693"/>
+            <a:ext cx="10781838" cy="860649"/>
+          </a:xfrm>
+        </p:spPr>
+        <p:txBody>
+          <a:bodyPr>
+            <a:normAutofit/>
+          </a:bodyPr>
+          <a:lstStyle/>
+          <a:p>
+            <a:r>
+              <a:rPr lang="pt-BR" sz="3600" dirty="0">
+                <a:solidFill>
+                  <a:srgbClr val="22223B"/>
+                </a:solidFill>
+                <a:latin typeface="Verdana" panose="020B0604030504040204" pitchFamily="34" charset="0"/>
+                <a:ea typeface="Verdana" panose="020B0604030504040204" pitchFamily="34" charset="0"/>
+              </a:rPr>
+              <a:t>Solução Técnica</a:t>
+            </a:r>
+          </a:p>
+        </p:txBody>
+      </p:sp>
+    </p:spTree>
+    <p:extLst>
+      <p:ext uri="{BB962C8B-B14F-4D97-AF65-F5344CB8AC3E}">
+        <p14:creationId xmlns:p14="http://schemas.microsoft.com/office/powerpoint/2010/main" val="1617020131"/>
+      </p:ext>
+    </p:extLst>
+  </p:cSld>
+  <p:clrMapOvr>
+    <a:masterClrMapping/>
+  </p:clrMapOvr>
+</p:sld>
+</file>
+
+<file path=ppt/slides/slide6.xml><?xml version="1.0" encoding="utf-8"?>
+<p:sld xmlns:a="http://schemas.openxmlformats.org/drawingml/2006/main" xmlns:r="http://schemas.openxmlformats.org/officeDocument/2006/relationships" xmlns:p="http://schemas.openxmlformats.org/presentationml/2006/main">
+  <p:cSld>
+    <p:bg>
+      <p:bgPr>
+        <a:solidFill>
+          <a:srgbClr val="EDF2F4"/>
+        </a:solidFill>
+        <a:effectLst/>
+      </p:bgPr>
+    </p:bg>
+    <p:spTree>
+      <p:nvGrpSpPr>
+        <p:cNvPr id="1" name=""/>
+        <p:cNvGrpSpPr/>
+        <p:nvPr/>
+      </p:nvGrpSpPr>
+      <p:grpSpPr>
+        <a:xfrm>
+          <a:off x="0" y="0"/>
+          <a:ext cx="0" cy="0"/>
+          <a:chOff x="0" y="0"/>
+          <a:chExt cx="0" cy="0"/>
+        </a:xfrm>
+      </p:grpSpPr>
+      <p:sp>
+        <p:nvSpPr>
+          <p:cNvPr id="2" name="Título 1">
+            <a:extLst>
+              <a:ext uri="{FF2B5EF4-FFF2-40B4-BE49-F238E27FC236}">
+                <a16:creationId xmlns:a16="http://schemas.microsoft.com/office/drawing/2014/main" id="{4513B46C-8276-1518-93A5-526E041946FC}"/>
+              </a:ext>
+            </a:extLst>
+          </p:cNvPr>
+          <p:cNvSpPr>
+            <a:spLocks noGrp="1"/>
+          </p:cNvSpPr>
+          <p:nvPr>
+            <p:ph type="title"/>
+          </p:nvPr>
+        </p:nvSpPr>
+        <p:spPr>
+          <a:xfrm>
+            <a:off x="302113" y="261693"/>
+            <a:ext cx="10781838" cy="860649"/>
+          </a:xfrm>
+        </p:spPr>
+        <p:txBody>
+          <a:bodyPr>
+            <a:normAutofit/>
+          </a:bodyPr>
+          <a:lstStyle/>
+          <a:p>
+            <a:r>
+              <a:rPr lang="pt-BR" sz="3600" dirty="0">
+                <a:solidFill>
+                  <a:srgbClr val="22223B"/>
+                </a:solidFill>
+                <a:latin typeface="Verdana" panose="020B0604030504040204" pitchFamily="34" charset="0"/>
+                <a:ea typeface="Verdana" panose="020B0604030504040204" pitchFamily="34" charset="0"/>
+              </a:rPr>
+              <a:t>DER</a:t>
+            </a:r>
+          </a:p>
+        </p:txBody>
+      </p:sp>
+    </p:spTree>
+    <p:extLst>
+      <p:ext uri="{BB962C8B-B14F-4D97-AF65-F5344CB8AC3E}">
+        <p14:creationId xmlns:p14="http://schemas.microsoft.com/office/powerpoint/2010/main" val="3028234208"/>
+      </p:ext>
+    </p:extLst>
+  </p:cSld>
+  <p:clrMapOvr>
+    <a:masterClrMapping/>
+  </p:clrMapOvr>
+</p:sld>
+</file>
+
+<file path=ppt/slides/slide7.xml><?xml version="1.0" encoding="utf-8"?>
+<p:sld xmlns:a="http://schemas.openxmlformats.org/drawingml/2006/main" xmlns:r="http://schemas.openxmlformats.org/officeDocument/2006/relationships" xmlns:p="http://schemas.openxmlformats.org/presentationml/2006/main">
+  <p:cSld>
+    <p:bg>
+      <p:bgPr>
+        <a:solidFill>
+          <a:srgbClr val="EDF2F4"/>
+        </a:solidFill>
+        <a:effectLst/>
+      </p:bgPr>
+    </p:bg>
+    <p:spTree>
+      <p:nvGrpSpPr>
+        <p:cNvPr id="1" name=""/>
+        <p:cNvGrpSpPr/>
+        <p:nvPr/>
+      </p:nvGrpSpPr>
+      <p:grpSpPr>
+        <a:xfrm>
+          <a:off x="0" y="0"/>
+          <a:ext cx="0" cy="0"/>
+          <a:chOff x="0" y="0"/>
+          <a:chExt cx="0" cy="0"/>
+        </a:xfrm>
+      </p:grpSpPr>
+      <p:sp>
+        <p:nvSpPr>
+          <p:cNvPr id="2" name="Título 1">
+            <a:extLst>
+              <a:ext uri="{FF2B5EF4-FFF2-40B4-BE49-F238E27FC236}">
+                <a16:creationId xmlns:a16="http://schemas.microsoft.com/office/drawing/2014/main" id="{4513B46C-8276-1518-93A5-526E041946FC}"/>
+              </a:ext>
+            </a:extLst>
+          </p:cNvPr>
+          <p:cNvSpPr>
+            <a:spLocks noGrp="1"/>
+          </p:cNvSpPr>
+          <p:nvPr>
+            <p:ph type="title"/>
+          </p:nvPr>
+        </p:nvSpPr>
+        <p:spPr>
+          <a:xfrm>
+            <a:off x="302113" y="261693"/>
+            <a:ext cx="10781838" cy="860649"/>
+          </a:xfrm>
+        </p:spPr>
+        <p:txBody>
+          <a:bodyPr>
+            <a:normAutofit/>
+          </a:bodyPr>
+          <a:lstStyle/>
+          <a:p>
+            <a:r>
+              <a:rPr lang="pt-BR" sz="3600" dirty="0">
+                <a:solidFill>
+                  <a:srgbClr val="22223B"/>
+                </a:solidFill>
+                <a:latin typeface="Verdana" panose="020B0604030504040204" pitchFamily="34" charset="0"/>
+                <a:ea typeface="Verdana" panose="020B0604030504040204" pitchFamily="34" charset="0"/>
+              </a:rPr>
+              <a:t>BPMN</a:t>
+            </a:r>
+          </a:p>
+        </p:txBody>
+      </p:sp>
+    </p:spTree>
+    <p:extLst>
+      <p:ext uri="{BB962C8B-B14F-4D97-AF65-F5344CB8AC3E}">
+        <p14:creationId xmlns:p14="http://schemas.microsoft.com/office/powerpoint/2010/main" val="4091252498"/>
+      </p:ext>
+    </p:extLst>
+  </p:cSld>
+  <p:clrMapOvr>
+    <a:masterClrMapping/>
+  </p:clrMapOvr>
+</p:sld>
+</file>
+
+<file path=ppt/slides/slide8.xml><?xml version="1.0" encoding="utf-8"?>
+<p:sld xmlns:a="http://schemas.openxmlformats.org/drawingml/2006/main" xmlns:r="http://schemas.openxmlformats.org/officeDocument/2006/relationships" xmlns:p="http://schemas.openxmlformats.org/presentationml/2006/main">
+  <p:cSld>
+    <p:bg>
+      <p:bgPr>
+        <a:solidFill>
+          <a:srgbClr val="EDF2F4"/>
+        </a:solidFill>
+        <a:effectLst/>
+      </p:bgPr>
+    </p:bg>
+    <p:spTree>
+      <p:nvGrpSpPr>
+        <p:cNvPr id="1" name=""/>
+        <p:cNvGrpSpPr/>
+        <p:nvPr/>
+      </p:nvGrpSpPr>
+      <p:grpSpPr>
+        <a:xfrm>
+          <a:off x="0" y="0"/>
+          <a:ext cx="0" cy="0"/>
+          <a:chOff x="0" y="0"/>
+          <a:chExt cx="0" cy="0"/>
+        </a:xfrm>
+      </p:grpSpPr>
+      <p:sp>
+        <p:nvSpPr>
+          <p:cNvPr id="7" name="Retângulo: Cantos Superiores Arredondados 6">
+            <a:extLst>
+              <a:ext uri="{FF2B5EF4-FFF2-40B4-BE49-F238E27FC236}">
+                <a16:creationId xmlns:a16="http://schemas.microsoft.com/office/drawing/2014/main" id="{89591122-9BDA-B1DC-83C5-582FBE8040DE}"/>
+              </a:ext>
+            </a:extLst>
+          </p:cNvPr>
+          <p:cNvSpPr/>
+          <p:nvPr/>
+        </p:nvSpPr>
+        <p:spPr>
+          <a:xfrm rot="5400000">
+            <a:off x="4987414" y="-680883"/>
+            <a:ext cx="6002592" cy="8406583"/>
+          </a:xfrm>
+          <a:prstGeom prst="round2SameRect">
+            <a:avLst/>
+          </a:prstGeom>
+          <a:solidFill>
+            <a:srgbClr val="BABAD8"/>
+          </a:solidFill>
+          <a:ln>
+            <a:noFill/>
+          </a:ln>
+        </p:spPr>
+        <p:style>
+          <a:lnRef idx="2">
+            <a:schemeClr val="accent1">
+              <a:shade val="15000"/>
+            </a:schemeClr>
+          </a:lnRef>
+          <a:fillRef idx="1">
+            <a:schemeClr val="accent1"/>
+          </a:fillRef>
+          <a:effectRef idx="0">
+            <a:schemeClr val="accent1"/>
+          </a:effectRef>
+          <a:fontRef idx="minor">
+            <a:schemeClr val="lt1"/>
+          </a:fontRef>
+        </p:style>
+        <p:txBody>
+          <a:bodyPr rtlCol="0" anchor="ctr"/>
+          <a:lstStyle/>
+          <a:p>
+            <a:pPr algn="ctr"/>
+            <a:endParaRPr lang="pt-BR" dirty="0"/>
+          </a:p>
+        </p:txBody>
+      </p:sp>
+      <p:sp>
+        <p:nvSpPr>
+          <p:cNvPr id="6" name="Retângulo: Cantos Superiores Arredondados 5">
+            <a:extLst>
+              <a:ext uri="{FF2B5EF4-FFF2-40B4-BE49-F238E27FC236}">
+                <a16:creationId xmlns:a16="http://schemas.microsoft.com/office/drawing/2014/main" id="{38563621-48BD-35F9-6511-8CD4F0AB0255}"/>
+              </a:ext>
+            </a:extLst>
+          </p:cNvPr>
+          <p:cNvSpPr/>
+          <p:nvPr/>
+        </p:nvSpPr>
+        <p:spPr>
+          <a:xfrm rot="5400000">
+            <a:off x="-872723" y="872723"/>
+            <a:ext cx="6858000" cy="5112555"/>
+          </a:xfrm>
+          <a:prstGeom prst="round2SameRect">
+            <a:avLst/>
+          </a:prstGeom>
+          <a:solidFill>
+            <a:srgbClr val="22223B"/>
+          </a:solidFill>
+          <a:ln>
+            <a:noFill/>
+          </a:ln>
+        </p:spPr>
+        <p:style>
+          <a:lnRef idx="2">
+            <a:schemeClr val="accent1">
+              <a:shade val="15000"/>
+            </a:schemeClr>
+          </a:lnRef>
+          <a:fillRef idx="1">
+            <a:schemeClr val="accent1"/>
+          </a:fillRef>
+          <a:effectRef idx="0">
+            <a:schemeClr val="accent1"/>
+          </a:effectRef>
+          <a:fontRef idx="minor">
+            <a:schemeClr val="lt1"/>
+          </a:fontRef>
+        </p:style>
+        <p:txBody>
+          <a:bodyPr rtlCol="0" anchor="ctr"/>
+          <a:lstStyle/>
+          <a:p>
+            <a:pPr algn="ctr"/>
+            <a:endParaRPr lang="pt-BR" dirty="0"/>
+          </a:p>
+        </p:txBody>
+      </p:sp>
+      <p:sp>
+        <p:nvSpPr>
+          <p:cNvPr id="8" name="Título 1">
+            <a:extLst>
+              <a:ext uri="{FF2B5EF4-FFF2-40B4-BE49-F238E27FC236}">
+                <a16:creationId xmlns:a16="http://schemas.microsoft.com/office/drawing/2014/main" id="{11E245A8-0589-E184-57BD-64071F3E7DBC}"/>
+              </a:ext>
+            </a:extLst>
+          </p:cNvPr>
+          <p:cNvSpPr>
+            <a:spLocks noGrp="1"/>
+          </p:cNvSpPr>
+          <p:nvPr>
+            <p:ph type="title"/>
+          </p:nvPr>
+        </p:nvSpPr>
+        <p:spPr>
+          <a:xfrm>
+            <a:off x="429933" y="599768"/>
+            <a:ext cx="3689784" cy="860649"/>
+          </a:xfrm>
+        </p:spPr>
+        <p:txBody>
+          <a:bodyPr>
+            <a:noAutofit/>
+          </a:bodyPr>
+          <a:lstStyle/>
+          <a:p>
+            <a:r>
+              <a:rPr lang="pt-BR" sz="1600" dirty="0">
+                <a:solidFill>
+                  <a:srgbClr val="EDF2F4"/>
+                </a:solidFill>
+                <a:latin typeface="Verdana" panose="020B0604030504040204" pitchFamily="34" charset="0"/>
+                <a:ea typeface="Verdana" panose="020B0604030504040204" pitchFamily="34" charset="0"/>
+              </a:rPr>
+              <a:t>O que é o SSH e sua importância na segurança da comunicação em rede?</a:t>
+            </a:r>
+          </a:p>
+        </p:txBody>
+      </p:sp>
+      <p:sp>
+        <p:nvSpPr>
+          <p:cNvPr id="9" name="Título 1">
+            <a:extLst>
+              <a:ext uri="{FF2B5EF4-FFF2-40B4-BE49-F238E27FC236}">
+                <a16:creationId xmlns:a16="http://schemas.microsoft.com/office/drawing/2014/main" id="{F8E54ECC-C108-E4E1-1D93-A126BC5205E4}"/>
+              </a:ext>
+            </a:extLst>
+          </p:cNvPr>
+          <p:cNvSpPr txBox="1">
+            <a:spLocks/>
+          </p:cNvSpPr>
+          <p:nvPr/>
+        </p:nvSpPr>
+        <p:spPr>
+          <a:xfrm>
+            <a:off x="429933" y="2998675"/>
+            <a:ext cx="3689784" cy="860649"/>
           </a:xfrm>
           <a:prstGeom prst="rect">
             <a:avLst/>
           </a:prstGeom>
-          <a:noFill/>
         </p:spPr>
         <p:txBody>
-          <a:bodyPr wrap="square" rtlCol="0">
-            <a:spAutoFit/>
+          <a:bodyPr vert="horz" lIns="91440" tIns="45720" rIns="91440" bIns="45720" rtlCol="0" anchor="ctr">
+            <a:noAutofit/>
           </a:bodyPr>
-          <a:lstStyle/>
-          <a:p>
-            <a:pPr marL="0" indent="0">
+          <a:lstStyle>
+            <a:lvl1pPr algn="l" defTabSz="914400" rtl="0" eaLnBrk="1" latinLnBrk="0" hangingPunct="1">
+              <a:lnSpc>
+                <a:spcPct val="90000"/>
+              </a:lnSpc>
+              <a:spcBef>
+                <a:spcPct val="0"/>
+              </a:spcBef>
               <a:buNone/>
-            </a:pPr>
-            <a:r>
-              <a:rPr lang="pt-BR" sz="6000" dirty="0"/>
-              <a:t>EOS:</a:t>
-            </a:r>
-          </a:p>
-          <a:p>
-            <a:pPr marL="342900" indent="-342900">
-              <a:buFont typeface="Arial" panose="020B0604020202020204" pitchFamily="34" charset="0"/>
-              <a:buChar char="•"/>
-            </a:pPr>
-            <a:r>
-              <a:rPr lang="pt-BR" sz="2000" dirty="0"/>
-              <a:t>L-10</a:t>
-            </a:r>
-          </a:p>
-          <a:p>
-            <a:pPr marL="342900" indent="-342900">
-              <a:buFont typeface="Arial" panose="020B0604020202020204" pitchFamily="34" charset="0"/>
-              <a:buChar char="•"/>
-            </a:pPr>
-            <a:r>
-              <a:rPr lang="pt-BR" sz="2000" dirty="0"/>
-              <a:t>IDS</a:t>
-            </a:r>
-          </a:p>
-          <a:p>
-            <a:endParaRPr lang="pt-BR" sz="1600" dirty="0"/>
-          </a:p>
-          <a:p>
-            <a:endParaRPr lang="pt-BR" dirty="0"/>
+              <a:defRPr sz="4400" kern="1200">
+                <a:solidFill>
+                  <a:schemeClr val="tx1"/>
+                </a:solidFill>
+                <a:latin typeface="+mj-lt"/>
+                <a:ea typeface="+mj-ea"/>
+                <a:cs typeface="+mj-cs"/>
+              </a:defRPr>
+            </a:lvl1pPr>
+          </a:lstStyle>
+          <a:p>
+            <a:r>
+              <a:rPr lang="pt-BR" sz="1600" dirty="0">
+                <a:solidFill>
+                  <a:srgbClr val="EDF2F4"/>
+                </a:solidFill>
+                <a:latin typeface="Verdana" panose="020B0604030504040204" pitchFamily="34" charset="0"/>
+                <a:ea typeface="Verdana" panose="020B0604030504040204" pitchFamily="34" charset="0"/>
+              </a:rPr>
+              <a:t>Como os técnicos podem utilizar o SSH para se conectar a instância na AWS de forma segura e eficiente?</a:t>
+            </a:r>
+          </a:p>
+        </p:txBody>
+      </p:sp>
+      <p:sp>
+        <p:nvSpPr>
+          <p:cNvPr id="10" name="Título 1">
+            <a:extLst>
+              <a:ext uri="{FF2B5EF4-FFF2-40B4-BE49-F238E27FC236}">
+                <a16:creationId xmlns:a16="http://schemas.microsoft.com/office/drawing/2014/main" id="{5E20E90A-338E-1E1B-6BED-86BE1E283FBB}"/>
+              </a:ext>
+            </a:extLst>
+          </p:cNvPr>
+          <p:cNvSpPr txBox="1">
+            <a:spLocks/>
+          </p:cNvSpPr>
+          <p:nvPr/>
+        </p:nvSpPr>
+        <p:spPr>
+          <a:xfrm>
+            <a:off x="429933" y="5397583"/>
+            <a:ext cx="3689784" cy="860649"/>
+          </a:xfrm>
+          <a:prstGeom prst="rect">
+            <a:avLst/>
+          </a:prstGeom>
+        </p:spPr>
+        <p:txBody>
+          <a:bodyPr vert="horz" lIns="91440" tIns="45720" rIns="91440" bIns="45720" rtlCol="0" anchor="ctr">
+            <a:noAutofit/>
+          </a:bodyPr>
+          <a:lstStyle>
+            <a:lvl1pPr algn="l" defTabSz="914400" rtl="0" eaLnBrk="1" latinLnBrk="0" hangingPunct="1">
+              <a:lnSpc>
+                <a:spcPct val="90000"/>
+              </a:lnSpc>
+              <a:spcBef>
+                <a:spcPct val="0"/>
+              </a:spcBef>
+              <a:buNone/>
+              <a:defRPr sz="4400" kern="1200">
+                <a:solidFill>
+                  <a:schemeClr val="tx1"/>
+                </a:solidFill>
+                <a:latin typeface="+mj-lt"/>
+                <a:ea typeface="+mj-ea"/>
+                <a:cs typeface="+mj-cs"/>
+              </a:defRPr>
+            </a:lvl1pPr>
+          </a:lstStyle>
+          <a:p>
+            <a:r>
+              <a:rPr lang="pt-BR" sz="1600" dirty="0">
+                <a:solidFill>
+                  <a:srgbClr val="EDF2F4"/>
+                </a:solidFill>
+                <a:latin typeface="Verdana" panose="020B0604030504040204" pitchFamily="34" charset="0"/>
+                <a:ea typeface="Verdana" panose="020B0604030504040204" pitchFamily="34" charset="0"/>
+              </a:rPr>
+              <a:t>Qual a flexibilidade e a praticidade dessa conexão?</a:t>
+            </a:r>
           </a:p>
         </p:txBody>
       </p:sp>
     </p:spTree>
     <p:extLst>
       <p:ext uri="{BB962C8B-B14F-4D97-AF65-F5344CB8AC3E}">
-        <p14:creationId xmlns:p14="http://schemas.microsoft.com/office/powerpoint/2010/main" val="53127966"/>
+        <p14:creationId xmlns:p14="http://schemas.microsoft.com/office/powerpoint/2010/main" val="3975286133"/>
+      </p:ext>
+    </p:extLst>
+  </p:cSld>
+  <p:clrMapOvr>
+    <a:masterClrMapping/>
+  </p:clrMapOvr>
+</p:sld>
+</file>
+
+<file path=ppt/slides/slide9.xml><?xml version="1.0" encoding="utf-8"?>
+<p:sld xmlns:a="http://schemas.openxmlformats.org/drawingml/2006/main" xmlns:r="http://schemas.openxmlformats.org/officeDocument/2006/relationships" xmlns:p="http://schemas.openxmlformats.org/presentationml/2006/main">
+  <p:cSld>
+    <p:bg>
+      <p:bgPr>
+        <a:solidFill>
+          <a:srgbClr val="EDF2F4"/>
+        </a:solidFill>
+        <a:effectLst/>
+      </p:bgPr>
+    </p:bg>
+    <p:spTree>
+      <p:nvGrpSpPr>
+        <p:cNvPr id="1" name=""/>
+        <p:cNvGrpSpPr/>
+        <p:nvPr/>
+      </p:nvGrpSpPr>
+      <p:grpSpPr>
+        <a:xfrm>
+          <a:off x="0" y="0"/>
+          <a:ext cx="0" cy="0"/>
+          <a:chOff x="0" y="0"/>
+          <a:chExt cx="0" cy="0"/>
+        </a:xfrm>
+      </p:grpSpPr>
+      <p:sp>
+        <p:nvSpPr>
+          <p:cNvPr id="7" name="Retângulo: Cantos Superiores Arredondados 6">
+            <a:extLst>
+              <a:ext uri="{FF2B5EF4-FFF2-40B4-BE49-F238E27FC236}">
+                <a16:creationId xmlns:a16="http://schemas.microsoft.com/office/drawing/2014/main" id="{89591122-9BDA-B1DC-83C5-582FBE8040DE}"/>
+              </a:ext>
+            </a:extLst>
+          </p:cNvPr>
+          <p:cNvSpPr/>
+          <p:nvPr/>
+        </p:nvSpPr>
+        <p:spPr>
+          <a:xfrm rot="5400000">
+            <a:off x="4817805" y="-774293"/>
+            <a:ext cx="6341808" cy="8406583"/>
+          </a:xfrm>
+          <a:prstGeom prst="round2SameRect">
+            <a:avLst/>
+          </a:prstGeom>
+          <a:solidFill>
+            <a:srgbClr val="BABAD8"/>
+          </a:solidFill>
+          <a:ln>
+            <a:noFill/>
+          </a:ln>
+        </p:spPr>
+        <p:style>
+          <a:lnRef idx="2">
+            <a:schemeClr val="accent1">
+              <a:shade val="15000"/>
+            </a:schemeClr>
+          </a:lnRef>
+          <a:fillRef idx="1">
+            <a:schemeClr val="accent1"/>
+          </a:fillRef>
+          <a:effectRef idx="0">
+            <a:schemeClr val="accent1"/>
+          </a:effectRef>
+          <a:fontRef idx="minor">
+            <a:schemeClr val="lt1"/>
+          </a:fontRef>
+        </p:style>
+        <p:txBody>
+          <a:bodyPr rtlCol="0" anchor="ctr"/>
+          <a:lstStyle/>
+          <a:p>
+            <a:pPr algn="ctr"/>
+            <a:endParaRPr lang="pt-BR" dirty="0"/>
+          </a:p>
+        </p:txBody>
+      </p:sp>
+      <p:sp>
+        <p:nvSpPr>
+          <p:cNvPr id="4" name="Retângulo: Cantos Superiores Arredondados 3">
+            <a:extLst>
+              <a:ext uri="{FF2B5EF4-FFF2-40B4-BE49-F238E27FC236}">
+                <a16:creationId xmlns:a16="http://schemas.microsoft.com/office/drawing/2014/main" id="{D61A0B57-C428-45B5-84A6-0C5ACB69650B}"/>
+              </a:ext>
+            </a:extLst>
+          </p:cNvPr>
+          <p:cNvSpPr/>
+          <p:nvPr/>
+        </p:nvSpPr>
+        <p:spPr>
+          <a:xfrm rot="5400000">
+            <a:off x="215275" y="1564524"/>
+            <a:ext cx="6690689" cy="3689784"/>
+          </a:xfrm>
+          <a:prstGeom prst="round2SameRect">
+            <a:avLst/>
+          </a:prstGeom>
+          <a:solidFill>
+            <a:srgbClr val="E4E4F0"/>
+          </a:solidFill>
+          <a:ln>
+            <a:noFill/>
+          </a:ln>
+        </p:spPr>
+        <p:style>
+          <a:lnRef idx="2">
+            <a:schemeClr val="accent1">
+              <a:shade val="15000"/>
+            </a:schemeClr>
+          </a:lnRef>
+          <a:fillRef idx="1">
+            <a:schemeClr val="accent1"/>
+          </a:fillRef>
+          <a:effectRef idx="0">
+            <a:schemeClr val="accent1"/>
+          </a:effectRef>
+          <a:fontRef idx="minor">
+            <a:schemeClr val="lt1"/>
+          </a:fontRef>
+        </p:style>
+        <p:txBody>
+          <a:bodyPr rtlCol="0" anchor="ctr"/>
+          <a:lstStyle/>
+          <a:p>
+            <a:pPr algn="ctr"/>
+            <a:endParaRPr lang="pt-BR" dirty="0"/>
+          </a:p>
+        </p:txBody>
+      </p:sp>
+      <p:sp>
+        <p:nvSpPr>
+          <p:cNvPr id="6" name="Retângulo: Cantos Superiores Arredondados 5">
+            <a:extLst>
+              <a:ext uri="{FF2B5EF4-FFF2-40B4-BE49-F238E27FC236}">
+                <a16:creationId xmlns:a16="http://schemas.microsoft.com/office/drawing/2014/main" id="{38563621-48BD-35F9-6511-8CD4F0AB0255}"/>
+              </a:ext>
+            </a:extLst>
+          </p:cNvPr>
+          <p:cNvSpPr/>
+          <p:nvPr/>
+        </p:nvSpPr>
+        <p:spPr>
+          <a:xfrm rot="5400000">
+            <a:off x="-872723" y="872723"/>
+            <a:ext cx="6858000" cy="5112555"/>
+          </a:xfrm>
+          <a:prstGeom prst="round2SameRect">
+            <a:avLst/>
+          </a:prstGeom>
+          <a:solidFill>
+            <a:srgbClr val="22223B"/>
+          </a:solidFill>
+          <a:ln>
+            <a:noFill/>
+          </a:ln>
+        </p:spPr>
+        <p:style>
+          <a:lnRef idx="2">
+            <a:schemeClr val="accent1">
+              <a:shade val="15000"/>
+            </a:schemeClr>
+          </a:lnRef>
+          <a:fillRef idx="1">
+            <a:schemeClr val="accent1"/>
+          </a:fillRef>
+          <a:effectRef idx="0">
+            <a:schemeClr val="accent1"/>
+          </a:effectRef>
+          <a:fontRef idx="minor">
+            <a:schemeClr val="lt1"/>
+          </a:fontRef>
+        </p:style>
+        <p:txBody>
+          <a:bodyPr rtlCol="0" anchor="ctr"/>
+          <a:lstStyle/>
+          <a:p>
+            <a:pPr algn="ctr"/>
+            <a:endParaRPr lang="pt-BR" dirty="0"/>
+          </a:p>
+        </p:txBody>
+      </p:sp>
+      <p:sp>
+        <p:nvSpPr>
+          <p:cNvPr id="8" name="Título 1">
+            <a:extLst>
+              <a:ext uri="{FF2B5EF4-FFF2-40B4-BE49-F238E27FC236}">
+                <a16:creationId xmlns:a16="http://schemas.microsoft.com/office/drawing/2014/main" id="{11E245A8-0589-E184-57BD-64071F3E7DBC}"/>
+              </a:ext>
+            </a:extLst>
+          </p:cNvPr>
+          <p:cNvSpPr>
+            <a:spLocks noGrp="1"/>
+          </p:cNvSpPr>
+          <p:nvPr>
+            <p:ph type="title"/>
+          </p:nvPr>
+        </p:nvSpPr>
+        <p:spPr>
+          <a:xfrm>
+            <a:off x="429933" y="599768"/>
+            <a:ext cx="3689784" cy="860649"/>
+          </a:xfrm>
+        </p:spPr>
+        <p:txBody>
+          <a:bodyPr>
+            <a:noAutofit/>
+          </a:bodyPr>
+          <a:lstStyle/>
+          <a:p>
+            <a:r>
+              <a:rPr lang="pt-BR" sz="1600" dirty="0">
+                <a:solidFill>
+                  <a:srgbClr val="EDF2F4"/>
+                </a:solidFill>
+                <a:latin typeface="Verdana" panose="020B0604030504040204" pitchFamily="34" charset="0"/>
+                <a:ea typeface="Verdana" panose="020B0604030504040204" pitchFamily="34" charset="0"/>
+              </a:rPr>
+              <a:t>O que é o SSH e sua importância na segurança da comunicação em rede?</a:t>
+            </a:r>
+          </a:p>
+        </p:txBody>
+      </p:sp>
+      <p:sp>
+        <p:nvSpPr>
+          <p:cNvPr id="9" name="Título 1">
+            <a:extLst>
+              <a:ext uri="{FF2B5EF4-FFF2-40B4-BE49-F238E27FC236}">
+                <a16:creationId xmlns:a16="http://schemas.microsoft.com/office/drawing/2014/main" id="{F8E54ECC-C108-E4E1-1D93-A126BC5205E4}"/>
+              </a:ext>
+            </a:extLst>
+          </p:cNvPr>
+          <p:cNvSpPr txBox="1">
+            <a:spLocks/>
+          </p:cNvSpPr>
+          <p:nvPr/>
+        </p:nvSpPr>
+        <p:spPr>
+          <a:xfrm>
+            <a:off x="429933" y="2998675"/>
+            <a:ext cx="3689784" cy="860649"/>
+          </a:xfrm>
+          <a:prstGeom prst="rect">
+            <a:avLst/>
+          </a:prstGeom>
+        </p:spPr>
+        <p:txBody>
+          <a:bodyPr vert="horz" lIns="91440" tIns="45720" rIns="91440" bIns="45720" rtlCol="0" anchor="ctr">
+            <a:noAutofit/>
+          </a:bodyPr>
+          <a:lstStyle>
+            <a:lvl1pPr algn="l" defTabSz="914400" rtl="0" eaLnBrk="1" latinLnBrk="0" hangingPunct="1">
+              <a:lnSpc>
+                <a:spcPct val="90000"/>
+              </a:lnSpc>
+              <a:spcBef>
+                <a:spcPct val="0"/>
+              </a:spcBef>
+              <a:buNone/>
+              <a:defRPr sz="4400" kern="1200">
+                <a:solidFill>
+                  <a:schemeClr val="tx1"/>
+                </a:solidFill>
+                <a:latin typeface="+mj-lt"/>
+                <a:ea typeface="+mj-ea"/>
+                <a:cs typeface="+mj-cs"/>
+              </a:defRPr>
+            </a:lvl1pPr>
+          </a:lstStyle>
+          <a:p>
+            <a:r>
+              <a:rPr lang="pt-BR" sz="1600" dirty="0">
+                <a:solidFill>
+                  <a:srgbClr val="EDF2F4"/>
+                </a:solidFill>
+                <a:latin typeface="Verdana" panose="020B0604030504040204" pitchFamily="34" charset="0"/>
+                <a:ea typeface="Verdana" panose="020B0604030504040204" pitchFamily="34" charset="0"/>
+              </a:rPr>
+              <a:t>Como os técnicos podem utilizar o SSH para se conectar a instância na AWS de forma segura e eficiente?</a:t>
+            </a:r>
+          </a:p>
+        </p:txBody>
+      </p:sp>
+      <p:sp>
+        <p:nvSpPr>
+          <p:cNvPr id="10" name="Título 1">
+            <a:extLst>
+              <a:ext uri="{FF2B5EF4-FFF2-40B4-BE49-F238E27FC236}">
+                <a16:creationId xmlns:a16="http://schemas.microsoft.com/office/drawing/2014/main" id="{5E20E90A-338E-1E1B-6BED-86BE1E283FBB}"/>
+              </a:ext>
+            </a:extLst>
+          </p:cNvPr>
+          <p:cNvSpPr txBox="1">
+            <a:spLocks/>
+          </p:cNvSpPr>
+          <p:nvPr/>
+        </p:nvSpPr>
+        <p:spPr>
+          <a:xfrm>
+            <a:off x="429933" y="5397583"/>
+            <a:ext cx="3689784" cy="860649"/>
+          </a:xfrm>
+          <a:prstGeom prst="rect">
+            <a:avLst/>
+          </a:prstGeom>
+        </p:spPr>
+        <p:txBody>
+          <a:bodyPr vert="horz" lIns="91440" tIns="45720" rIns="91440" bIns="45720" rtlCol="0" anchor="ctr">
+            <a:noAutofit/>
+          </a:bodyPr>
+          <a:lstStyle>
+            <a:lvl1pPr algn="l" defTabSz="914400" rtl="0" eaLnBrk="1" latinLnBrk="0" hangingPunct="1">
+              <a:lnSpc>
+                <a:spcPct val="90000"/>
+              </a:lnSpc>
+              <a:spcBef>
+                <a:spcPct val="0"/>
+              </a:spcBef>
+              <a:buNone/>
+              <a:defRPr sz="4400" kern="1200">
+                <a:solidFill>
+                  <a:schemeClr val="tx1"/>
+                </a:solidFill>
+                <a:latin typeface="+mj-lt"/>
+                <a:ea typeface="+mj-ea"/>
+                <a:cs typeface="+mj-cs"/>
+              </a:defRPr>
+            </a:lvl1pPr>
+          </a:lstStyle>
+          <a:p>
+            <a:r>
+              <a:rPr lang="pt-BR" sz="1600" dirty="0">
+                <a:solidFill>
+                  <a:srgbClr val="EDF2F4"/>
+                </a:solidFill>
+                <a:latin typeface="Verdana" panose="020B0604030504040204" pitchFamily="34" charset="0"/>
+                <a:ea typeface="Verdana" panose="020B0604030504040204" pitchFamily="34" charset="0"/>
+              </a:rPr>
+              <a:t>Qual a flexibilidade e a praticidade dessa conexão?</a:t>
+            </a:r>
+          </a:p>
+        </p:txBody>
+      </p:sp>
+      <p:sp>
+        <p:nvSpPr>
+          <p:cNvPr id="2" name="Fluxograma: Processo Alternativo 1">
+            <a:extLst>
+              <a:ext uri="{FF2B5EF4-FFF2-40B4-BE49-F238E27FC236}">
+                <a16:creationId xmlns:a16="http://schemas.microsoft.com/office/drawing/2014/main" id="{0698AE17-AC4B-111C-2E40-07BD8BEF3A6F}"/>
+              </a:ext>
+            </a:extLst>
+          </p:cNvPr>
+          <p:cNvSpPr/>
+          <p:nvPr/>
+        </p:nvSpPr>
+        <p:spPr>
+          <a:xfrm>
+            <a:off x="0" y="4503176"/>
+            <a:ext cx="12192000" cy="235646"/>
+          </a:xfrm>
+          <a:prstGeom prst="flowChartAlternateProcess">
+            <a:avLst/>
+          </a:prstGeom>
+          <a:solidFill>
+            <a:srgbClr val="E4E4F0"/>
+          </a:solidFill>
+          <a:ln>
+            <a:noFill/>
+          </a:ln>
+        </p:spPr>
+        <p:style>
+          <a:lnRef idx="2">
+            <a:schemeClr val="accent1">
+              <a:shade val="15000"/>
+            </a:schemeClr>
+          </a:lnRef>
+          <a:fillRef idx="1">
+            <a:schemeClr val="accent1"/>
+          </a:fillRef>
+          <a:effectRef idx="0">
+            <a:schemeClr val="accent1"/>
+          </a:effectRef>
+          <a:fontRef idx="minor">
+            <a:schemeClr val="lt1"/>
+          </a:fontRef>
+        </p:style>
+        <p:txBody>
+          <a:bodyPr rtlCol="0" anchor="ctr"/>
+          <a:lstStyle/>
+          <a:p>
+            <a:pPr algn="ctr"/>
+            <a:endParaRPr lang="pt-BR"/>
+          </a:p>
+        </p:txBody>
+      </p:sp>
+      <p:sp>
+        <p:nvSpPr>
+          <p:cNvPr id="3" name="Fluxograma: Processo Alternativo 2">
+            <a:extLst>
+              <a:ext uri="{FF2B5EF4-FFF2-40B4-BE49-F238E27FC236}">
+                <a16:creationId xmlns:a16="http://schemas.microsoft.com/office/drawing/2014/main" id="{891B84C8-505A-FFFE-DA01-46ADF443374B}"/>
+              </a:ext>
+            </a:extLst>
+          </p:cNvPr>
+          <p:cNvSpPr/>
+          <p:nvPr/>
+        </p:nvSpPr>
+        <p:spPr>
+          <a:xfrm>
+            <a:off x="-4915" y="1848955"/>
+            <a:ext cx="12196915" cy="235646"/>
+          </a:xfrm>
+          <a:prstGeom prst="flowChartAlternateProcess">
+            <a:avLst/>
+          </a:prstGeom>
+          <a:solidFill>
+            <a:srgbClr val="E4E4F0"/>
+          </a:solidFill>
+          <a:ln>
+            <a:noFill/>
+          </a:ln>
+        </p:spPr>
+        <p:style>
+          <a:lnRef idx="2">
+            <a:schemeClr val="accent1">
+              <a:shade val="15000"/>
+            </a:schemeClr>
+          </a:lnRef>
+          <a:fillRef idx="1">
+            <a:schemeClr val="accent1"/>
+          </a:fillRef>
+          <a:effectRef idx="0">
+            <a:schemeClr val="accent1"/>
+          </a:effectRef>
+          <a:fontRef idx="minor">
+            <a:schemeClr val="lt1"/>
+          </a:fontRef>
+        </p:style>
+        <p:txBody>
+          <a:bodyPr rtlCol="0" anchor="ctr"/>
+          <a:lstStyle/>
+          <a:p>
+            <a:pPr algn="ctr"/>
+            <a:endParaRPr lang="pt-BR"/>
+          </a:p>
+        </p:txBody>
+      </p:sp>
+      <p:sp>
+        <p:nvSpPr>
+          <p:cNvPr id="5" name="Título 1">
+            <a:extLst>
+              <a:ext uri="{FF2B5EF4-FFF2-40B4-BE49-F238E27FC236}">
+                <a16:creationId xmlns:a16="http://schemas.microsoft.com/office/drawing/2014/main" id="{7F6C1108-6AB0-FD06-EE7C-072DC9BA704B}"/>
+              </a:ext>
+            </a:extLst>
+          </p:cNvPr>
+          <p:cNvSpPr txBox="1">
+            <a:spLocks/>
+          </p:cNvSpPr>
+          <p:nvPr/>
+        </p:nvSpPr>
+        <p:spPr>
+          <a:xfrm>
+            <a:off x="6398349" y="599768"/>
+            <a:ext cx="3689784" cy="993058"/>
+          </a:xfrm>
+          <a:prstGeom prst="rect">
+            <a:avLst/>
+          </a:prstGeom>
+        </p:spPr>
+        <p:txBody>
+          <a:bodyPr vert="horz" lIns="91440" tIns="45720" rIns="91440" bIns="45720" rtlCol="0" anchor="ctr">
+            <a:noAutofit/>
+          </a:bodyPr>
+          <a:lstStyle>
+            <a:lvl1pPr algn="l" defTabSz="914400" rtl="0" eaLnBrk="1" latinLnBrk="0" hangingPunct="1">
+              <a:lnSpc>
+                <a:spcPct val="90000"/>
+              </a:lnSpc>
+              <a:spcBef>
+                <a:spcPct val="0"/>
+              </a:spcBef>
+              <a:buNone/>
+              <a:defRPr sz="4400" kern="1200">
+                <a:solidFill>
+                  <a:schemeClr val="tx1"/>
+                </a:solidFill>
+                <a:latin typeface="+mj-lt"/>
+                <a:ea typeface="+mj-ea"/>
+                <a:cs typeface="+mj-cs"/>
+              </a:defRPr>
+            </a:lvl1pPr>
+          </a:lstStyle>
+          <a:p>
+            <a:r>
+              <a:rPr lang="pt-BR" sz="1600" dirty="0">
+                <a:solidFill>
+                  <a:srgbClr val="22223B"/>
+                </a:solidFill>
+                <a:latin typeface="Verdana" panose="020B0604030504040204" pitchFamily="34" charset="0"/>
+                <a:ea typeface="Verdana" panose="020B0604030504040204" pitchFamily="34" charset="0"/>
+              </a:rPr>
+              <a:t>O SSH, ou </a:t>
+            </a:r>
+            <a:r>
+              <a:rPr lang="pt-BR" sz="1600" dirty="0" err="1">
+                <a:solidFill>
+                  <a:srgbClr val="22223B"/>
+                </a:solidFill>
+                <a:latin typeface="Verdana" panose="020B0604030504040204" pitchFamily="34" charset="0"/>
+                <a:ea typeface="Verdana" panose="020B0604030504040204" pitchFamily="34" charset="0"/>
+              </a:rPr>
+              <a:t>Secure</a:t>
+            </a:r>
+            <a:r>
+              <a:rPr lang="pt-BR" sz="1600" dirty="0">
+                <a:solidFill>
+                  <a:srgbClr val="22223B"/>
+                </a:solidFill>
+                <a:latin typeface="Verdana" panose="020B0604030504040204" pitchFamily="34" charset="0"/>
+                <a:ea typeface="Verdana" panose="020B0604030504040204" pitchFamily="34" charset="0"/>
+              </a:rPr>
+              <a:t> Shell, é um protocolo que garante comunicação segura entre dois sistemas.</a:t>
+            </a:r>
+          </a:p>
+        </p:txBody>
+      </p:sp>
+      <p:sp>
+        <p:nvSpPr>
+          <p:cNvPr id="11" name="Título 1">
+            <a:extLst>
+              <a:ext uri="{FF2B5EF4-FFF2-40B4-BE49-F238E27FC236}">
+                <a16:creationId xmlns:a16="http://schemas.microsoft.com/office/drawing/2014/main" id="{EC1031B5-4455-A8A1-E498-E567D02E32B1}"/>
+              </a:ext>
+            </a:extLst>
+          </p:cNvPr>
+          <p:cNvSpPr txBox="1">
+            <a:spLocks/>
+          </p:cNvSpPr>
+          <p:nvPr/>
+        </p:nvSpPr>
+        <p:spPr>
+          <a:xfrm>
+            <a:off x="6398349" y="2863564"/>
+            <a:ext cx="3689784" cy="1165204"/>
+          </a:xfrm>
+          <a:prstGeom prst="rect">
+            <a:avLst/>
+          </a:prstGeom>
+        </p:spPr>
+        <p:txBody>
+          <a:bodyPr vert="horz" lIns="91440" tIns="45720" rIns="91440" bIns="45720" rtlCol="0" anchor="ctr">
+            <a:noAutofit/>
+          </a:bodyPr>
+          <a:lstStyle>
+            <a:lvl1pPr algn="l" defTabSz="914400" rtl="0" eaLnBrk="1" latinLnBrk="0" hangingPunct="1">
+              <a:lnSpc>
+                <a:spcPct val="90000"/>
+              </a:lnSpc>
+              <a:spcBef>
+                <a:spcPct val="0"/>
+              </a:spcBef>
+              <a:buNone/>
+              <a:defRPr sz="4400" kern="1200">
+                <a:solidFill>
+                  <a:schemeClr val="tx1"/>
+                </a:solidFill>
+                <a:latin typeface="+mj-lt"/>
+                <a:ea typeface="+mj-ea"/>
+                <a:cs typeface="+mj-cs"/>
+              </a:defRPr>
+            </a:lvl1pPr>
+          </a:lstStyle>
+          <a:p>
+            <a:r>
+              <a:rPr lang="pt-BR" sz="1600" dirty="0">
+                <a:solidFill>
+                  <a:srgbClr val="22223B"/>
+                </a:solidFill>
+                <a:latin typeface="Verdana" panose="020B0604030504040204" pitchFamily="34" charset="0"/>
+                <a:ea typeface="Verdana" panose="020B0604030504040204" pitchFamily="34" charset="0"/>
+              </a:rPr>
+              <a:t>Esse método oferece segurança robusta, já que a autenticação é baseada em chaves criptográficas e elimina a necessidade de senhas.</a:t>
+            </a:r>
+          </a:p>
+        </p:txBody>
+      </p:sp>
+      <p:sp>
+        <p:nvSpPr>
+          <p:cNvPr id="13" name="Título 1">
+            <a:extLst>
+              <a:ext uri="{FF2B5EF4-FFF2-40B4-BE49-F238E27FC236}">
+                <a16:creationId xmlns:a16="http://schemas.microsoft.com/office/drawing/2014/main" id="{083A9691-7D67-9B57-2076-BD83D12C11C7}"/>
+              </a:ext>
+            </a:extLst>
+          </p:cNvPr>
+          <p:cNvSpPr txBox="1">
+            <a:spLocks/>
+          </p:cNvSpPr>
+          <p:nvPr/>
+        </p:nvSpPr>
+        <p:spPr>
+          <a:xfrm>
+            <a:off x="6398349" y="5101307"/>
+            <a:ext cx="3689784" cy="1108913"/>
+          </a:xfrm>
+          <a:prstGeom prst="rect">
+            <a:avLst/>
+          </a:prstGeom>
+        </p:spPr>
+        <p:txBody>
+          <a:bodyPr vert="horz" lIns="91440" tIns="45720" rIns="91440" bIns="45720" rtlCol="0" anchor="ctr">
+            <a:noAutofit/>
+          </a:bodyPr>
+          <a:lstStyle>
+            <a:lvl1pPr algn="l" defTabSz="914400" rtl="0" eaLnBrk="1" latinLnBrk="0" hangingPunct="1">
+              <a:lnSpc>
+                <a:spcPct val="90000"/>
+              </a:lnSpc>
+              <a:spcBef>
+                <a:spcPct val="0"/>
+              </a:spcBef>
+              <a:buNone/>
+              <a:defRPr sz="4400" kern="1200">
+                <a:solidFill>
+                  <a:schemeClr val="tx1"/>
+                </a:solidFill>
+                <a:latin typeface="+mj-lt"/>
+                <a:ea typeface="+mj-ea"/>
+                <a:cs typeface="+mj-cs"/>
+              </a:defRPr>
+            </a:lvl1pPr>
+          </a:lstStyle>
+          <a:p>
+            <a:r>
+              <a:rPr lang="pt-BR" sz="1600" dirty="0">
+                <a:solidFill>
+                  <a:srgbClr val="22223B"/>
+                </a:solidFill>
+                <a:latin typeface="Verdana" panose="020B0604030504040204" pitchFamily="34" charset="0"/>
+                <a:ea typeface="Verdana" panose="020B0604030504040204" pitchFamily="34" charset="0"/>
+              </a:rPr>
+              <a:t>Tem flexibilidade ao permitir o acesso remoto seguro a instâncias, capacidade de gerenciar e configurar as instâncias remotamente</a:t>
+            </a:r>
+          </a:p>
+        </p:txBody>
+      </p:sp>
+    </p:spTree>
+    <p:extLst>
+      <p:ext uri="{BB962C8B-B14F-4D97-AF65-F5344CB8AC3E}">
+        <p14:creationId xmlns:p14="http://schemas.microsoft.com/office/powerpoint/2010/main" val="763755075"/>
       </p:ext>
     </p:extLst>
   </p:cSld>

</xml_diff>